<commit_message>
v1 & v2 of my programm
</commit_message>
<xml_diff>
--- a/out/slides_ver_1.pptx
+++ b/out/slides_ver_1.pptx
@@ -9,7 +9,7 @@
     <p:sldId id="257" r:id="rId3"/>
     <p:sldId id="258" r:id="rId4"/>
   </p:sldIdLst>
-  <p:sldSz cx="9144000" cy="5143500" type="screen16x9"/>
+  <p:sldSz cx="9144000" cy="6858000" type="screen4x3"/>
   <p:notesSz cx="6858000" cy="9144000"/>
   <p:defaultTextStyle>
     <a:defPPr>
@@ -109,12 +109,12 @@
   <p:extLst>
     <p:ext uri="{EFAFB233-063F-42B5-8137-9DF3F51BA10A}">
       <p15:sldGuideLst xmlns:p15="http://schemas.microsoft.com/office/powerpoint/2012/main">
-        <p15:guide id="1" orient="horz" pos="1620" userDrawn="1">
+        <p15:guide id="1" orient="horz" pos="2160">
           <p15:clr>
             <a:srgbClr val="A4A3A4"/>
           </p15:clr>
         </p15:guide>
-        <p15:guide id="2" pos="2880" userDrawn="1">
+        <p15:guide id="2" pos="2880">
           <p15:clr>
             <a:srgbClr val="A4A3A4"/>
           </p15:clr>
@@ -154,8 +154,8 @@
         </p:nvSpPr>
         <p:spPr>
           <a:xfrm>
-            <a:off x="685800" y="1597819"/>
-            <a:ext cx="7772400" cy="1102519"/>
+            <a:off x="685800" y="2130425"/>
+            <a:ext cx="7772400" cy="1470025"/>
           </a:xfrm>
         </p:spPr>
         <p:txBody>
@@ -163,9 +163,10 @@
           <a:lstStyle/>
           <a:p>
             <a:r>
-              <a:rPr lang="en-US"/>
+              <a:rPr lang="en-US" smtClean="0"/>
               <a:t>Click to edit Master title style</a:t>
             </a:r>
+            <a:endParaRPr lang="en-US"/>
           </a:p>
         </p:txBody>
       </p:sp>
@@ -181,8 +182,8 @@
         </p:nvSpPr>
         <p:spPr>
           <a:xfrm>
-            <a:off x="1371600" y="2914650"/>
-            <a:ext cx="6400800" cy="1314450"/>
+            <a:off x="1371600" y="3886200"/>
+            <a:ext cx="6400800" cy="1752600"/>
           </a:xfrm>
         </p:spPr>
         <p:txBody>
@@ -198,7 +199,7 @@
                 </a:solidFill>
               </a:defRPr>
             </a:lvl1pPr>
-            <a:lvl2pPr marL="342900" indent="0" algn="ctr">
+            <a:lvl2pPr marL="457200" indent="0" algn="ctr">
               <a:buNone/>
               <a:defRPr>
                 <a:solidFill>
@@ -208,7 +209,7 @@
                 </a:solidFill>
               </a:defRPr>
             </a:lvl2pPr>
-            <a:lvl3pPr marL="685800" indent="0" algn="ctr">
+            <a:lvl3pPr marL="914400" indent="0" algn="ctr">
               <a:buNone/>
               <a:defRPr>
                 <a:solidFill>
@@ -218,7 +219,7 @@
                 </a:solidFill>
               </a:defRPr>
             </a:lvl3pPr>
-            <a:lvl4pPr marL="1028700" indent="0" algn="ctr">
+            <a:lvl4pPr marL="1371600" indent="0" algn="ctr">
               <a:buNone/>
               <a:defRPr>
                 <a:solidFill>
@@ -228,7 +229,7 @@
                 </a:solidFill>
               </a:defRPr>
             </a:lvl4pPr>
-            <a:lvl5pPr marL="1371600" indent="0" algn="ctr">
+            <a:lvl5pPr marL="1828800" indent="0" algn="ctr">
               <a:buNone/>
               <a:defRPr>
                 <a:solidFill>
@@ -238,7 +239,7 @@
                 </a:solidFill>
               </a:defRPr>
             </a:lvl5pPr>
-            <a:lvl6pPr marL="1714500" indent="0" algn="ctr">
+            <a:lvl6pPr marL="2286000" indent="0" algn="ctr">
               <a:buNone/>
               <a:defRPr>
                 <a:solidFill>
@@ -248,7 +249,7 @@
                 </a:solidFill>
               </a:defRPr>
             </a:lvl6pPr>
-            <a:lvl7pPr marL="2057400" indent="0" algn="ctr">
+            <a:lvl7pPr marL="2743200" indent="0" algn="ctr">
               <a:buNone/>
               <a:defRPr>
                 <a:solidFill>
@@ -258,7 +259,7 @@
                 </a:solidFill>
               </a:defRPr>
             </a:lvl7pPr>
-            <a:lvl8pPr marL="2400300" indent="0" algn="ctr">
+            <a:lvl8pPr marL="3200400" indent="0" algn="ctr">
               <a:buNone/>
               <a:defRPr>
                 <a:solidFill>
@@ -268,7 +269,7 @@
                 </a:solidFill>
               </a:defRPr>
             </a:lvl8pPr>
-            <a:lvl9pPr marL="2743200" indent="0" algn="ctr">
+            <a:lvl9pPr marL="3657600" indent="0" algn="ctr">
               <a:buNone/>
               <a:defRPr>
                 <a:solidFill>
@@ -281,9 +282,10 @@
           </a:lstStyle>
           <a:p>
             <a:r>
-              <a:rPr lang="en-US"/>
+              <a:rPr lang="en-US" smtClean="0"/>
               <a:t>Click to edit Master subtitle style</a:t>
             </a:r>
+            <a:endParaRPr lang="en-US"/>
           </a:p>
         </p:txBody>
       </p:sp>
@@ -304,7 +306,7 @@
           <a:p>
             <a:fld id="{241EB5C9-1307-BA42-ABA2-0BC069CD8E7F}" type="datetimeFigureOut">
               <a:rPr lang="en-US" smtClean="0"/>
-              <a:t>1/2/22</a:t>
+              <a:t>4/5/2019</a:t>
             </a:fld>
             <a:endParaRPr lang="en-US"/>
           </a:p>
@@ -398,9 +400,10 @@
           <a:lstStyle/>
           <a:p>
             <a:r>
-              <a:rPr lang="en-US"/>
+              <a:rPr lang="en-US" smtClean="0"/>
               <a:t>Click to edit Master title style</a:t>
             </a:r>
+            <a:endParaRPr lang="en-US"/>
           </a:p>
         </p:txBody>
       </p:sp>
@@ -421,37 +424,38 @@
           <a:p>
             <a:pPr lvl="0"/>
             <a:r>
-              <a:rPr lang="en-US"/>
+              <a:rPr lang="en-US" smtClean="0"/>
               <a:t>Click to edit Master text styles</a:t>
             </a:r>
           </a:p>
           <a:p>
             <a:pPr lvl="1"/>
             <a:r>
-              <a:rPr lang="en-US"/>
+              <a:rPr lang="en-US" smtClean="0"/>
               <a:t>Second level</a:t>
             </a:r>
           </a:p>
           <a:p>
             <a:pPr lvl="2"/>
             <a:r>
-              <a:rPr lang="en-US"/>
+              <a:rPr lang="en-US" smtClean="0"/>
               <a:t>Third level</a:t>
             </a:r>
           </a:p>
           <a:p>
             <a:pPr lvl="3"/>
             <a:r>
-              <a:rPr lang="en-US"/>
+              <a:rPr lang="en-US" smtClean="0"/>
               <a:t>Fourth level</a:t>
             </a:r>
           </a:p>
           <a:p>
             <a:pPr lvl="4"/>
             <a:r>
-              <a:rPr lang="en-US"/>
+              <a:rPr lang="en-US" smtClean="0"/>
               <a:t>Fifth level</a:t>
             </a:r>
+            <a:endParaRPr lang="en-US"/>
           </a:p>
         </p:txBody>
       </p:sp>
@@ -472,7 +476,7 @@
           <a:p>
             <a:fld id="{241EB5C9-1307-BA42-ABA2-0BC069CD8E7F}" type="datetimeFigureOut">
               <a:rPr lang="en-US" smtClean="0"/>
-              <a:t>1/2/22</a:t>
+              <a:t>4/5/2019</a:t>
             </a:fld>
             <a:endParaRPr lang="en-US"/>
           </a:p>
@@ -562,8 +566,8 @@
         </p:nvSpPr>
         <p:spPr>
           <a:xfrm>
-            <a:off x="6629400" y="205979"/>
-            <a:ext cx="2057400" cy="4388644"/>
+            <a:off x="6629400" y="274638"/>
+            <a:ext cx="2057400" cy="5851525"/>
           </a:xfrm>
         </p:spPr>
         <p:txBody>
@@ -571,9 +575,10 @@
           <a:lstStyle/>
           <a:p>
             <a:r>
-              <a:rPr lang="en-US"/>
+              <a:rPr lang="en-US" smtClean="0"/>
               <a:t>Click to edit Master title style</a:t>
             </a:r>
+            <a:endParaRPr lang="en-US"/>
           </a:p>
         </p:txBody>
       </p:sp>
@@ -589,8 +594,8 @@
         </p:nvSpPr>
         <p:spPr>
           <a:xfrm>
-            <a:off x="457200" y="205979"/>
-            <a:ext cx="6019800" cy="4388644"/>
+            <a:off x="457200" y="274638"/>
+            <a:ext cx="6019800" cy="5851525"/>
           </a:xfrm>
         </p:spPr>
         <p:txBody>
@@ -599,37 +604,38 @@
           <a:p>
             <a:pPr lvl="0"/>
             <a:r>
-              <a:rPr lang="en-US"/>
+              <a:rPr lang="en-US" smtClean="0"/>
               <a:t>Click to edit Master text styles</a:t>
             </a:r>
           </a:p>
           <a:p>
             <a:pPr lvl="1"/>
             <a:r>
-              <a:rPr lang="en-US"/>
+              <a:rPr lang="en-US" smtClean="0"/>
               <a:t>Second level</a:t>
             </a:r>
           </a:p>
           <a:p>
             <a:pPr lvl="2"/>
             <a:r>
-              <a:rPr lang="en-US"/>
+              <a:rPr lang="en-US" smtClean="0"/>
               <a:t>Third level</a:t>
             </a:r>
           </a:p>
           <a:p>
             <a:pPr lvl="3"/>
             <a:r>
-              <a:rPr lang="en-US"/>
+              <a:rPr lang="en-US" smtClean="0"/>
               <a:t>Fourth level</a:t>
             </a:r>
           </a:p>
           <a:p>
             <a:pPr lvl="4"/>
             <a:r>
-              <a:rPr lang="en-US"/>
+              <a:rPr lang="en-US" smtClean="0"/>
               <a:t>Fifth level</a:t>
             </a:r>
+            <a:endParaRPr lang="en-US"/>
           </a:p>
         </p:txBody>
       </p:sp>
@@ -650,7 +656,7 @@
           <a:p>
             <a:fld id="{241EB5C9-1307-BA42-ABA2-0BC069CD8E7F}" type="datetimeFigureOut">
               <a:rPr lang="en-US" smtClean="0"/>
-              <a:t>1/2/22</a:t>
+              <a:t>4/5/2019</a:t>
             </a:fld>
             <a:endParaRPr lang="en-US"/>
           </a:p>
@@ -744,9 +750,10 @@
           <a:lstStyle/>
           <a:p>
             <a:r>
-              <a:rPr lang="en-US"/>
+              <a:rPr lang="en-US" smtClean="0"/>
               <a:t>Click to edit Master title style</a:t>
             </a:r>
+            <a:endParaRPr lang="en-US"/>
           </a:p>
         </p:txBody>
       </p:sp>
@@ -767,37 +774,38 @@
           <a:p>
             <a:pPr lvl="0"/>
             <a:r>
-              <a:rPr lang="en-US"/>
+              <a:rPr lang="en-US" smtClean="0"/>
               <a:t>Click to edit Master text styles</a:t>
             </a:r>
           </a:p>
           <a:p>
             <a:pPr lvl="1"/>
             <a:r>
-              <a:rPr lang="en-US"/>
+              <a:rPr lang="en-US" smtClean="0"/>
               <a:t>Second level</a:t>
             </a:r>
           </a:p>
           <a:p>
             <a:pPr lvl="2"/>
             <a:r>
-              <a:rPr lang="en-US"/>
+              <a:rPr lang="en-US" smtClean="0"/>
               <a:t>Third level</a:t>
             </a:r>
           </a:p>
           <a:p>
             <a:pPr lvl="3"/>
             <a:r>
-              <a:rPr lang="en-US"/>
+              <a:rPr lang="en-US" smtClean="0"/>
               <a:t>Fourth level</a:t>
             </a:r>
           </a:p>
           <a:p>
             <a:pPr lvl="4"/>
             <a:r>
-              <a:rPr lang="en-US"/>
+              <a:rPr lang="en-US" smtClean="0"/>
               <a:t>Fifth level</a:t>
             </a:r>
+            <a:endParaRPr lang="en-US"/>
           </a:p>
         </p:txBody>
       </p:sp>
@@ -818,7 +826,7 @@
           <a:p>
             <a:fld id="{241EB5C9-1307-BA42-ABA2-0BC069CD8E7F}" type="datetimeFigureOut">
               <a:rPr lang="en-US" smtClean="0"/>
-              <a:t>1/2/22</a:t>
+              <a:t>4/5/2019</a:t>
             </a:fld>
             <a:endParaRPr lang="en-US"/>
           </a:p>
@@ -908,22 +916,23 @@
         </p:nvSpPr>
         <p:spPr>
           <a:xfrm>
-            <a:off x="722313" y="3305176"/>
-            <a:ext cx="7772400" cy="1021556"/>
+            <a:off x="722313" y="4406900"/>
+            <a:ext cx="7772400" cy="1362075"/>
           </a:xfrm>
         </p:spPr>
         <p:txBody>
           <a:bodyPr anchor="t"/>
           <a:lstStyle>
             <a:lvl1pPr algn="l">
-              <a:defRPr sz="3000" b="1" cap="all"/>
+              <a:defRPr sz="4000" b="1" cap="all"/>
             </a:lvl1pPr>
           </a:lstStyle>
           <a:p>
             <a:r>
-              <a:rPr lang="en-US"/>
+              <a:rPr lang="en-US" smtClean="0"/>
               <a:t>Click to edit Master title style</a:t>
             </a:r>
+            <a:endParaRPr lang="en-US"/>
           </a:p>
         </p:txBody>
       </p:sp>
@@ -939,8 +948,8 @@
         </p:nvSpPr>
         <p:spPr>
           <a:xfrm>
-            <a:off x="722313" y="2180035"/>
-            <a:ext cx="7772400" cy="1125140"/>
+            <a:off x="722313" y="2906713"/>
+            <a:ext cx="7772400" cy="1500187"/>
           </a:xfrm>
         </p:spPr>
         <p:txBody>
@@ -948,7 +957,7 @@
           <a:lstStyle>
             <a:lvl1pPr marL="0" indent="0">
               <a:buNone/>
-              <a:defRPr sz="1500">
+              <a:defRPr sz="2000">
                 <a:solidFill>
                   <a:schemeClr val="tx1">
                     <a:tint val="75000"/>
@@ -956,9 +965,9 @@
                 </a:solidFill>
               </a:defRPr>
             </a:lvl1pPr>
-            <a:lvl2pPr marL="342900" indent="0">
-              <a:buNone/>
-              <a:defRPr sz="1350">
+            <a:lvl2pPr marL="457200" indent="0">
+              <a:buNone/>
+              <a:defRPr sz="1800">
                 <a:solidFill>
                   <a:schemeClr val="tx1">
                     <a:tint val="75000"/>
@@ -966,9 +975,9 @@
                 </a:solidFill>
               </a:defRPr>
             </a:lvl2pPr>
-            <a:lvl3pPr marL="685800" indent="0">
-              <a:buNone/>
-              <a:defRPr sz="1200">
+            <a:lvl3pPr marL="914400" indent="0">
+              <a:buNone/>
+              <a:defRPr sz="1600">
                 <a:solidFill>
                   <a:schemeClr val="tx1">
                     <a:tint val="75000"/>
@@ -976,9 +985,9 @@
                 </a:solidFill>
               </a:defRPr>
             </a:lvl3pPr>
-            <a:lvl4pPr marL="1028700" indent="0">
-              <a:buNone/>
-              <a:defRPr sz="1050">
+            <a:lvl4pPr marL="1371600" indent="0">
+              <a:buNone/>
+              <a:defRPr sz="1400">
                 <a:solidFill>
                   <a:schemeClr val="tx1">
                     <a:tint val="75000"/>
@@ -986,9 +995,9 @@
                 </a:solidFill>
               </a:defRPr>
             </a:lvl4pPr>
-            <a:lvl5pPr marL="1371600" indent="0">
-              <a:buNone/>
-              <a:defRPr sz="1050">
+            <a:lvl5pPr marL="1828800" indent="0">
+              <a:buNone/>
+              <a:defRPr sz="1400">
                 <a:solidFill>
                   <a:schemeClr val="tx1">
                     <a:tint val="75000"/>
@@ -996,9 +1005,9 @@
                 </a:solidFill>
               </a:defRPr>
             </a:lvl5pPr>
-            <a:lvl6pPr marL="1714500" indent="0">
-              <a:buNone/>
-              <a:defRPr sz="1050">
+            <a:lvl6pPr marL="2286000" indent="0">
+              <a:buNone/>
+              <a:defRPr sz="1400">
                 <a:solidFill>
                   <a:schemeClr val="tx1">
                     <a:tint val="75000"/>
@@ -1006,9 +1015,9 @@
                 </a:solidFill>
               </a:defRPr>
             </a:lvl6pPr>
-            <a:lvl7pPr marL="2057400" indent="0">
-              <a:buNone/>
-              <a:defRPr sz="1050">
+            <a:lvl7pPr marL="2743200" indent="0">
+              <a:buNone/>
+              <a:defRPr sz="1400">
                 <a:solidFill>
                   <a:schemeClr val="tx1">
                     <a:tint val="75000"/>
@@ -1016,9 +1025,9 @@
                 </a:solidFill>
               </a:defRPr>
             </a:lvl7pPr>
-            <a:lvl8pPr marL="2400300" indent="0">
-              <a:buNone/>
-              <a:defRPr sz="1050">
+            <a:lvl8pPr marL="3200400" indent="0">
+              <a:buNone/>
+              <a:defRPr sz="1400">
                 <a:solidFill>
                   <a:schemeClr val="tx1">
                     <a:tint val="75000"/>
@@ -1026,9 +1035,9 @@
                 </a:solidFill>
               </a:defRPr>
             </a:lvl8pPr>
-            <a:lvl9pPr marL="2743200" indent="0">
-              <a:buNone/>
-              <a:defRPr sz="1050">
+            <a:lvl9pPr marL="3657600" indent="0">
+              <a:buNone/>
+              <a:defRPr sz="1400">
                 <a:solidFill>
                   <a:schemeClr val="tx1">
                     <a:tint val="75000"/>
@@ -1040,7 +1049,7 @@
           <a:p>
             <a:pPr lvl="0"/>
             <a:r>
-              <a:rPr lang="en-US"/>
+              <a:rPr lang="en-US" smtClean="0"/>
               <a:t>Click to edit Master text styles</a:t>
             </a:r>
           </a:p>
@@ -1063,7 +1072,7 @@
           <a:p>
             <a:fld id="{241EB5C9-1307-BA42-ABA2-0BC069CD8E7F}" type="datetimeFigureOut">
               <a:rPr lang="en-US" smtClean="0"/>
-              <a:t>1/2/22</a:t>
+              <a:t>4/5/2019</a:t>
             </a:fld>
             <a:endParaRPr lang="en-US"/>
           </a:p>
@@ -1157,9 +1166,10 @@
           <a:lstStyle/>
           <a:p>
             <a:r>
-              <a:rPr lang="en-US"/>
+              <a:rPr lang="en-US" smtClean="0"/>
               <a:t>Click to edit Master title style</a:t>
             </a:r>
+            <a:endParaRPr lang="en-US"/>
           </a:p>
         </p:txBody>
       </p:sp>
@@ -1175,75 +1185,76 @@
         </p:nvSpPr>
         <p:spPr>
           <a:xfrm>
-            <a:off x="457200" y="1200151"/>
-            <a:ext cx="4038600" cy="3394472"/>
+            <a:off x="457200" y="1600200"/>
+            <a:ext cx="4038600" cy="4525963"/>
           </a:xfrm>
         </p:spPr>
         <p:txBody>
           <a:bodyPr/>
           <a:lstStyle>
             <a:lvl1pPr>
-              <a:defRPr sz="2100"/>
+              <a:defRPr sz="2800"/>
             </a:lvl1pPr>
             <a:lvl2pPr>
-              <a:defRPr sz="1800"/>
+              <a:defRPr sz="2400"/>
             </a:lvl2pPr>
             <a:lvl3pPr>
-              <a:defRPr sz="1500"/>
+              <a:defRPr sz="2000"/>
             </a:lvl3pPr>
             <a:lvl4pPr>
-              <a:defRPr sz="1350"/>
+              <a:defRPr sz="1800"/>
             </a:lvl4pPr>
             <a:lvl5pPr>
-              <a:defRPr sz="1350"/>
+              <a:defRPr sz="1800"/>
             </a:lvl5pPr>
             <a:lvl6pPr>
-              <a:defRPr sz="1350"/>
+              <a:defRPr sz="1800"/>
             </a:lvl6pPr>
             <a:lvl7pPr>
-              <a:defRPr sz="1350"/>
+              <a:defRPr sz="1800"/>
             </a:lvl7pPr>
             <a:lvl8pPr>
-              <a:defRPr sz="1350"/>
+              <a:defRPr sz="1800"/>
             </a:lvl8pPr>
             <a:lvl9pPr>
-              <a:defRPr sz="1350"/>
+              <a:defRPr sz="1800"/>
             </a:lvl9pPr>
           </a:lstStyle>
           <a:p>
             <a:pPr lvl="0"/>
             <a:r>
-              <a:rPr lang="en-US"/>
+              <a:rPr lang="en-US" smtClean="0"/>
               <a:t>Click to edit Master text styles</a:t>
             </a:r>
           </a:p>
           <a:p>
             <a:pPr lvl="1"/>
             <a:r>
-              <a:rPr lang="en-US"/>
+              <a:rPr lang="en-US" smtClean="0"/>
               <a:t>Second level</a:t>
             </a:r>
           </a:p>
           <a:p>
             <a:pPr lvl="2"/>
             <a:r>
-              <a:rPr lang="en-US"/>
+              <a:rPr lang="en-US" smtClean="0"/>
               <a:t>Third level</a:t>
             </a:r>
           </a:p>
           <a:p>
             <a:pPr lvl="3"/>
             <a:r>
-              <a:rPr lang="en-US"/>
+              <a:rPr lang="en-US" smtClean="0"/>
               <a:t>Fourth level</a:t>
             </a:r>
           </a:p>
           <a:p>
             <a:pPr lvl="4"/>
             <a:r>
-              <a:rPr lang="en-US"/>
+              <a:rPr lang="en-US" smtClean="0"/>
               <a:t>Fifth level</a:t>
             </a:r>
+            <a:endParaRPr lang="en-US"/>
           </a:p>
         </p:txBody>
       </p:sp>
@@ -1259,75 +1270,76 @@
         </p:nvSpPr>
         <p:spPr>
           <a:xfrm>
-            <a:off x="4648200" y="1200151"/>
-            <a:ext cx="4038600" cy="3394472"/>
+            <a:off x="4648200" y="1600200"/>
+            <a:ext cx="4038600" cy="4525963"/>
           </a:xfrm>
         </p:spPr>
         <p:txBody>
           <a:bodyPr/>
           <a:lstStyle>
             <a:lvl1pPr>
-              <a:defRPr sz="2100"/>
+              <a:defRPr sz="2800"/>
             </a:lvl1pPr>
             <a:lvl2pPr>
-              <a:defRPr sz="1800"/>
+              <a:defRPr sz="2400"/>
             </a:lvl2pPr>
             <a:lvl3pPr>
-              <a:defRPr sz="1500"/>
+              <a:defRPr sz="2000"/>
             </a:lvl3pPr>
             <a:lvl4pPr>
-              <a:defRPr sz="1350"/>
+              <a:defRPr sz="1800"/>
             </a:lvl4pPr>
             <a:lvl5pPr>
-              <a:defRPr sz="1350"/>
+              <a:defRPr sz="1800"/>
             </a:lvl5pPr>
             <a:lvl6pPr>
-              <a:defRPr sz="1350"/>
+              <a:defRPr sz="1800"/>
             </a:lvl6pPr>
             <a:lvl7pPr>
-              <a:defRPr sz="1350"/>
+              <a:defRPr sz="1800"/>
             </a:lvl7pPr>
             <a:lvl8pPr>
-              <a:defRPr sz="1350"/>
+              <a:defRPr sz="1800"/>
             </a:lvl8pPr>
             <a:lvl9pPr>
-              <a:defRPr sz="1350"/>
+              <a:defRPr sz="1800"/>
             </a:lvl9pPr>
           </a:lstStyle>
           <a:p>
             <a:pPr lvl="0"/>
             <a:r>
-              <a:rPr lang="en-US"/>
+              <a:rPr lang="en-US" smtClean="0"/>
               <a:t>Click to edit Master text styles</a:t>
             </a:r>
           </a:p>
           <a:p>
             <a:pPr lvl="1"/>
             <a:r>
-              <a:rPr lang="en-US"/>
+              <a:rPr lang="en-US" smtClean="0"/>
               <a:t>Second level</a:t>
             </a:r>
           </a:p>
           <a:p>
             <a:pPr lvl="2"/>
             <a:r>
-              <a:rPr lang="en-US"/>
+              <a:rPr lang="en-US" smtClean="0"/>
               <a:t>Third level</a:t>
             </a:r>
           </a:p>
           <a:p>
             <a:pPr lvl="3"/>
             <a:r>
-              <a:rPr lang="en-US"/>
+              <a:rPr lang="en-US" smtClean="0"/>
               <a:t>Fourth level</a:t>
             </a:r>
           </a:p>
           <a:p>
             <a:pPr lvl="4"/>
             <a:r>
-              <a:rPr lang="en-US"/>
+              <a:rPr lang="en-US" smtClean="0"/>
               <a:t>Fifth level</a:t>
             </a:r>
+            <a:endParaRPr lang="en-US"/>
           </a:p>
         </p:txBody>
       </p:sp>
@@ -1348,7 +1360,7 @@
           <a:p>
             <a:fld id="{241EB5C9-1307-BA42-ABA2-0BC069CD8E7F}" type="datetimeFigureOut">
               <a:rPr lang="en-US" smtClean="0"/>
-              <a:t>1/2/22</a:t>
+              <a:t>4/5/2019</a:t>
             </a:fld>
             <a:endParaRPr lang="en-US"/>
           </a:p>
@@ -1446,9 +1458,10 @@
           </a:lstStyle>
           <a:p>
             <a:r>
-              <a:rPr lang="en-US"/>
+              <a:rPr lang="en-US" smtClean="0"/>
               <a:t>Click to edit Master title style</a:t>
             </a:r>
+            <a:endParaRPr lang="en-US"/>
           </a:p>
         </p:txBody>
       </p:sp>
@@ -1464,8 +1477,8 @@
         </p:nvSpPr>
         <p:spPr>
           <a:xfrm>
-            <a:off x="457200" y="1151335"/>
-            <a:ext cx="4040188" cy="479822"/>
+            <a:off x="457200" y="1535113"/>
+            <a:ext cx="4040188" cy="639762"/>
           </a:xfrm>
         </p:spPr>
         <p:txBody>
@@ -1473,45 +1486,45 @@
           <a:lstStyle>
             <a:lvl1pPr marL="0" indent="0">
               <a:buNone/>
+              <a:defRPr sz="2400" b="1"/>
+            </a:lvl1pPr>
+            <a:lvl2pPr marL="457200" indent="0">
+              <a:buNone/>
+              <a:defRPr sz="2000" b="1"/>
+            </a:lvl2pPr>
+            <a:lvl3pPr marL="914400" indent="0">
+              <a:buNone/>
               <a:defRPr sz="1800" b="1"/>
-            </a:lvl1pPr>
-            <a:lvl2pPr marL="342900" indent="0">
-              <a:buNone/>
-              <a:defRPr sz="1500" b="1"/>
-            </a:lvl2pPr>
-            <a:lvl3pPr marL="685800" indent="0">
-              <a:buNone/>
-              <a:defRPr sz="1350" b="1"/>
             </a:lvl3pPr>
-            <a:lvl4pPr marL="1028700" indent="0">
-              <a:buNone/>
-              <a:defRPr sz="1200" b="1"/>
+            <a:lvl4pPr marL="1371600" indent="0">
+              <a:buNone/>
+              <a:defRPr sz="1600" b="1"/>
             </a:lvl4pPr>
-            <a:lvl5pPr marL="1371600" indent="0">
-              <a:buNone/>
-              <a:defRPr sz="1200" b="1"/>
+            <a:lvl5pPr marL="1828800" indent="0">
+              <a:buNone/>
+              <a:defRPr sz="1600" b="1"/>
             </a:lvl5pPr>
-            <a:lvl6pPr marL="1714500" indent="0">
-              <a:buNone/>
-              <a:defRPr sz="1200" b="1"/>
+            <a:lvl6pPr marL="2286000" indent="0">
+              <a:buNone/>
+              <a:defRPr sz="1600" b="1"/>
             </a:lvl6pPr>
-            <a:lvl7pPr marL="2057400" indent="0">
-              <a:buNone/>
-              <a:defRPr sz="1200" b="1"/>
+            <a:lvl7pPr marL="2743200" indent="0">
+              <a:buNone/>
+              <a:defRPr sz="1600" b="1"/>
             </a:lvl7pPr>
-            <a:lvl8pPr marL="2400300" indent="0">
-              <a:buNone/>
-              <a:defRPr sz="1200" b="1"/>
+            <a:lvl8pPr marL="3200400" indent="0">
+              <a:buNone/>
+              <a:defRPr sz="1600" b="1"/>
             </a:lvl8pPr>
-            <a:lvl9pPr marL="2743200" indent="0">
-              <a:buNone/>
-              <a:defRPr sz="1200" b="1"/>
+            <a:lvl9pPr marL="3657600" indent="0">
+              <a:buNone/>
+              <a:defRPr sz="1600" b="1"/>
             </a:lvl9pPr>
           </a:lstStyle>
           <a:p>
             <a:pPr lvl="0"/>
             <a:r>
-              <a:rPr lang="en-US"/>
+              <a:rPr lang="en-US" smtClean="0"/>
               <a:t>Click to edit Master text styles</a:t>
             </a:r>
           </a:p>
@@ -1529,75 +1542,76 @@
         </p:nvSpPr>
         <p:spPr>
           <a:xfrm>
-            <a:off x="457200" y="1631156"/>
-            <a:ext cx="4040188" cy="2963466"/>
+            <a:off x="457200" y="2174875"/>
+            <a:ext cx="4040188" cy="3951288"/>
           </a:xfrm>
         </p:spPr>
         <p:txBody>
           <a:bodyPr/>
           <a:lstStyle>
             <a:lvl1pPr>
-              <a:defRPr sz="1800"/>
+              <a:defRPr sz="2400"/>
             </a:lvl1pPr>
             <a:lvl2pPr>
-              <a:defRPr sz="1500"/>
+              <a:defRPr sz="2000"/>
             </a:lvl2pPr>
             <a:lvl3pPr>
-              <a:defRPr sz="1350"/>
+              <a:defRPr sz="1800"/>
             </a:lvl3pPr>
             <a:lvl4pPr>
-              <a:defRPr sz="1200"/>
+              <a:defRPr sz="1600"/>
             </a:lvl4pPr>
             <a:lvl5pPr>
-              <a:defRPr sz="1200"/>
+              <a:defRPr sz="1600"/>
             </a:lvl5pPr>
             <a:lvl6pPr>
-              <a:defRPr sz="1200"/>
+              <a:defRPr sz="1600"/>
             </a:lvl6pPr>
             <a:lvl7pPr>
-              <a:defRPr sz="1200"/>
+              <a:defRPr sz="1600"/>
             </a:lvl7pPr>
             <a:lvl8pPr>
-              <a:defRPr sz="1200"/>
+              <a:defRPr sz="1600"/>
             </a:lvl8pPr>
             <a:lvl9pPr>
-              <a:defRPr sz="1200"/>
+              <a:defRPr sz="1600"/>
             </a:lvl9pPr>
           </a:lstStyle>
           <a:p>
             <a:pPr lvl="0"/>
             <a:r>
-              <a:rPr lang="en-US"/>
+              <a:rPr lang="en-US" smtClean="0"/>
               <a:t>Click to edit Master text styles</a:t>
             </a:r>
           </a:p>
           <a:p>
             <a:pPr lvl="1"/>
             <a:r>
-              <a:rPr lang="en-US"/>
+              <a:rPr lang="en-US" smtClean="0"/>
               <a:t>Second level</a:t>
             </a:r>
           </a:p>
           <a:p>
             <a:pPr lvl="2"/>
             <a:r>
-              <a:rPr lang="en-US"/>
+              <a:rPr lang="en-US" smtClean="0"/>
               <a:t>Third level</a:t>
             </a:r>
           </a:p>
           <a:p>
             <a:pPr lvl="3"/>
             <a:r>
-              <a:rPr lang="en-US"/>
+              <a:rPr lang="en-US" smtClean="0"/>
               <a:t>Fourth level</a:t>
             </a:r>
           </a:p>
           <a:p>
             <a:pPr lvl="4"/>
             <a:r>
-              <a:rPr lang="en-US"/>
+              <a:rPr lang="en-US" smtClean="0"/>
               <a:t>Fifth level</a:t>
             </a:r>
+            <a:endParaRPr lang="en-US"/>
           </a:p>
         </p:txBody>
       </p:sp>
@@ -1613,8 +1627,8 @@
         </p:nvSpPr>
         <p:spPr>
           <a:xfrm>
-            <a:off x="4645026" y="1151335"/>
-            <a:ext cx="4041775" cy="479822"/>
+            <a:off x="4645025" y="1535113"/>
+            <a:ext cx="4041775" cy="639762"/>
           </a:xfrm>
         </p:spPr>
         <p:txBody>
@@ -1622,45 +1636,45 @@
           <a:lstStyle>
             <a:lvl1pPr marL="0" indent="0">
               <a:buNone/>
+              <a:defRPr sz="2400" b="1"/>
+            </a:lvl1pPr>
+            <a:lvl2pPr marL="457200" indent="0">
+              <a:buNone/>
+              <a:defRPr sz="2000" b="1"/>
+            </a:lvl2pPr>
+            <a:lvl3pPr marL="914400" indent="0">
+              <a:buNone/>
               <a:defRPr sz="1800" b="1"/>
-            </a:lvl1pPr>
-            <a:lvl2pPr marL="342900" indent="0">
-              <a:buNone/>
-              <a:defRPr sz="1500" b="1"/>
-            </a:lvl2pPr>
-            <a:lvl3pPr marL="685800" indent="0">
-              <a:buNone/>
-              <a:defRPr sz="1350" b="1"/>
             </a:lvl3pPr>
-            <a:lvl4pPr marL="1028700" indent="0">
-              <a:buNone/>
-              <a:defRPr sz="1200" b="1"/>
+            <a:lvl4pPr marL="1371600" indent="0">
+              <a:buNone/>
+              <a:defRPr sz="1600" b="1"/>
             </a:lvl4pPr>
-            <a:lvl5pPr marL="1371600" indent="0">
-              <a:buNone/>
-              <a:defRPr sz="1200" b="1"/>
+            <a:lvl5pPr marL="1828800" indent="0">
+              <a:buNone/>
+              <a:defRPr sz="1600" b="1"/>
             </a:lvl5pPr>
-            <a:lvl6pPr marL="1714500" indent="0">
-              <a:buNone/>
-              <a:defRPr sz="1200" b="1"/>
+            <a:lvl6pPr marL="2286000" indent="0">
+              <a:buNone/>
+              <a:defRPr sz="1600" b="1"/>
             </a:lvl6pPr>
-            <a:lvl7pPr marL="2057400" indent="0">
-              <a:buNone/>
-              <a:defRPr sz="1200" b="1"/>
+            <a:lvl7pPr marL="2743200" indent="0">
+              <a:buNone/>
+              <a:defRPr sz="1600" b="1"/>
             </a:lvl7pPr>
-            <a:lvl8pPr marL="2400300" indent="0">
-              <a:buNone/>
-              <a:defRPr sz="1200" b="1"/>
+            <a:lvl8pPr marL="3200400" indent="0">
+              <a:buNone/>
+              <a:defRPr sz="1600" b="1"/>
             </a:lvl8pPr>
-            <a:lvl9pPr marL="2743200" indent="0">
-              <a:buNone/>
-              <a:defRPr sz="1200" b="1"/>
+            <a:lvl9pPr marL="3657600" indent="0">
+              <a:buNone/>
+              <a:defRPr sz="1600" b="1"/>
             </a:lvl9pPr>
           </a:lstStyle>
           <a:p>
             <a:pPr lvl="0"/>
             <a:r>
-              <a:rPr lang="en-US"/>
+              <a:rPr lang="en-US" smtClean="0"/>
               <a:t>Click to edit Master text styles</a:t>
             </a:r>
           </a:p>
@@ -1678,75 +1692,76 @@
         </p:nvSpPr>
         <p:spPr>
           <a:xfrm>
-            <a:off x="4645026" y="1631156"/>
-            <a:ext cx="4041775" cy="2963466"/>
+            <a:off x="4645025" y="2174875"/>
+            <a:ext cx="4041775" cy="3951288"/>
           </a:xfrm>
         </p:spPr>
         <p:txBody>
           <a:bodyPr/>
           <a:lstStyle>
             <a:lvl1pPr>
-              <a:defRPr sz="1800"/>
+              <a:defRPr sz="2400"/>
             </a:lvl1pPr>
             <a:lvl2pPr>
-              <a:defRPr sz="1500"/>
+              <a:defRPr sz="2000"/>
             </a:lvl2pPr>
             <a:lvl3pPr>
-              <a:defRPr sz="1350"/>
+              <a:defRPr sz="1800"/>
             </a:lvl3pPr>
             <a:lvl4pPr>
-              <a:defRPr sz="1200"/>
+              <a:defRPr sz="1600"/>
             </a:lvl4pPr>
             <a:lvl5pPr>
-              <a:defRPr sz="1200"/>
+              <a:defRPr sz="1600"/>
             </a:lvl5pPr>
             <a:lvl6pPr>
-              <a:defRPr sz="1200"/>
+              <a:defRPr sz="1600"/>
             </a:lvl6pPr>
             <a:lvl7pPr>
-              <a:defRPr sz="1200"/>
+              <a:defRPr sz="1600"/>
             </a:lvl7pPr>
             <a:lvl8pPr>
-              <a:defRPr sz="1200"/>
+              <a:defRPr sz="1600"/>
             </a:lvl8pPr>
             <a:lvl9pPr>
-              <a:defRPr sz="1200"/>
+              <a:defRPr sz="1600"/>
             </a:lvl9pPr>
           </a:lstStyle>
           <a:p>
             <a:pPr lvl="0"/>
             <a:r>
-              <a:rPr lang="en-US"/>
+              <a:rPr lang="en-US" smtClean="0"/>
               <a:t>Click to edit Master text styles</a:t>
             </a:r>
           </a:p>
           <a:p>
             <a:pPr lvl="1"/>
             <a:r>
-              <a:rPr lang="en-US"/>
+              <a:rPr lang="en-US" smtClean="0"/>
               <a:t>Second level</a:t>
             </a:r>
           </a:p>
           <a:p>
             <a:pPr lvl="2"/>
             <a:r>
-              <a:rPr lang="en-US"/>
+              <a:rPr lang="en-US" smtClean="0"/>
               <a:t>Third level</a:t>
             </a:r>
           </a:p>
           <a:p>
             <a:pPr lvl="3"/>
             <a:r>
-              <a:rPr lang="en-US"/>
+              <a:rPr lang="en-US" smtClean="0"/>
               <a:t>Fourth level</a:t>
             </a:r>
           </a:p>
           <a:p>
             <a:pPr lvl="4"/>
             <a:r>
-              <a:rPr lang="en-US"/>
+              <a:rPr lang="en-US" smtClean="0"/>
               <a:t>Fifth level</a:t>
             </a:r>
+            <a:endParaRPr lang="en-US"/>
           </a:p>
         </p:txBody>
       </p:sp>
@@ -1767,7 +1782,7 @@
           <a:p>
             <a:fld id="{241EB5C9-1307-BA42-ABA2-0BC069CD8E7F}" type="datetimeFigureOut">
               <a:rPr lang="en-US" smtClean="0"/>
-              <a:t>1/2/22</a:t>
+              <a:t>4/5/2019</a:t>
             </a:fld>
             <a:endParaRPr lang="en-US"/>
           </a:p>
@@ -1861,9 +1876,10 @@
           <a:lstStyle/>
           <a:p>
             <a:r>
-              <a:rPr lang="en-US"/>
+              <a:rPr lang="en-US" smtClean="0"/>
               <a:t>Click to edit Master title style</a:t>
             </a:r>
+            <a:endParaRPr lang="en-US"/>
           </a:p>
         </p:txBody>
       </p:sp>
@@ -1884,7 +1900,7 @@
           <a:p>
             <a:fld id="{241EB5C9-1307-BA42-ABA2-0BC069CD8E7F}" type="datetimeFigureOut">
               <a:rPr lang="en-US" smtClean="0"/>
-              <a:t>1/2/22</a:t>
+              <a:t>4/5/2019</a:t>
             </a:fld>
             <a:endParaRPr lang="en-US"/>
           </a:p>
@@ -1979,7 +1995,7 @@
           <a:p>
             <a:fld id="{241EB5C9-1307-BA42-ABA2-0BC069CD8E7F}" type="datetimeFigureOut">
               <a:rPr lang="en-US" smtClean="0"/>
-              <a:t>1/2/22</a:t>
+              <a:t>4/5/2019</a:t>
             </a:fld>
             <a:endParaRPr lang="en-US"/>
           </a:p>
@@ -2069,22 +2085,23 @@
         </p:nvSpPr>
         <p:spPr>
           <a:xfrm>
-            <a:off x="457201" y="204787"/>
-            <a:ext cx="3008313" cy="871538"/>
+            <a:off x="457200" y="273050"/>
+            <a:ext cx="3008313" cy="1162050"/>
           </a:xfrm>
         </p:spPr>
         <p:txBody>
           <a:bodyPr anchor="b"/>
           <a:lstStyle>
             <a:lvl1pPr algn="l">
-              <a:defRPr sz="1500" b="1"/>
+              <a:defRPr sz="2000" b="1"/>
             </a:lvl1pPr>
           </a:lstStyle>
           <a:p>
             <a:r>
-              <a:rPr lang="en-US"/>
+              <a:rPr lang="en-US" smtClean="0"/>
               <a:t>Click to edit Master title style</a:t>
             </a:r>
+            <a:endParaRPr lang="en-US"/>
           </a:p>
         </p:txBody>
       </p:sp>
@@ -2100,75 +2117,76 @@
         </p:nvSpPr>
         <p:spPr>
           <a:xfrm>
-            <a:off x="3575050" y="204788"/>
-            <a:ext cx="5111750" cy="4389835"/>
+            <a:off x="3575050" y="273050"/>
+            <a:ext cx="5111750" cy="5853113"/>
           </a:xfrm>
         </p:spPr>
         <p:txBody>
           <a:bodyPr/>
           <a:lstStyle>
             <a:lvl1pPr>
-              <a:defRPr sz="2400"/>
+              <a:defRPr sz="3200"/>
             </a:lvl1pPr>
             <a:lvl2pPr>
-              <a:defRPr sz="2100"/>
+              <a:defRPr sz="2800"/>
             </a:lvl2pPr>
             <a:lvl3pPr>
-              <a:defRPr sz="1800"/>
+              <a:defRPr sz="2400"/>
             </a:lvl3pPr>
             <a:lvl4pPr>
-              <a:defRPr sz="1500"/>
+              <a:defRPr sz="2000"/>
             </a:lvl4pPr>
             <a:lvl5pPr>
-              <a:defRPr sz="1500"/>
+              <a:defRPr sz="2000"/>
             </a:lvl5pPr>
             <a:lvl6pPr>
-              <a:defRPr sz="1500"/>
+              <a:defRPr sz="2000"/>
             </a:lvl6pPr>
             <a:lvl7pPr>
-              <a:defRPr sz="1500"/>
+              <a:defRPr sz="2000"/>
             </a:lvl7pPr>
             <a:lvl8pPr>
-              <a:defRPr sz="1500"/>
+              <a:defRPr sz="2000"/>
             </a:lvl8pPr>
             <a:lvl9pPr>
-              <a:defRPr sz="1500"/>
+              <a:defRPr sz="2000"/>
             </a:lvl9pPr>
           </a:lstStyle>
           <a:p>
             <a:pPr lvl="0"/>
             <a:r>
-              <a:rPr lang="en-US"/>
+              <a:rPr lang="en-US" smtClean="0"/>
               <a:t>Click to edit Master text styles</a:t>
             </a:r>
           </a:p>
           <a:p>
             <a:pPr lvl="1"/>
             <a:r>
-              <a:rPr lang="en-US"/>
+              <a:rPr lang="en-US" smtClean="0"/>
               <a:t>Second level</a:t>
             </a:r>
           </a:p>
           <a:p>
             <a:pPr lvl="2"/>
             <a:r>
-              <a:rPr lang="en-US"/>
+              <a:rPr lang="en-US" smtClean="0"/>
               <a:t>Third level</a:t>
             </a:r>
           </a:p>
           <a:p>
             <a:pPr lvl="3"/>
             <a:r>
-              <a:rPr lang="en-US"/>
+              <a:rPr lang="en-US" smtClean="0"/>
               <a:t>Fourth level</a:t>
             </a:r>
           </a:p>
           <a:p>
             <a:pPr lvl="4"/>
             <a:r>
-              <a:rPr lang="en-US"/>
+              <a:rPr lang="en-US" smtClean="0"/>
               <a:t>Fifth level</a:t>
             </a:r>
+            <a:endParaRPr lang="en-US"/>
           </a:p>
         </p:txBody>
       </p:sp>
@@ -2184,8 +2202,8 @@
         </p:nvSpPr>
         <p:spPr>
           <a:xfrm>
-            <a:off x="457201" y="1076326"/>
-            <a:ext cx="3008313" cy="3518297"/>
+            <a:off x="457200" y="1435100"/>
+            <a:ext cx="3008313" cy="4691063"/>
           </a:xfrm>
         </p:spPr>
         <p:txBody>
@@ -2193,45 +2211,45 @@
           <a:lstStyle>
             <a:lvl1pPr marL="0" indent="0">
               <a:buNone/>
-              <a:defRPr sz="1050"/>
+              <a:defRPr sz="1400"/>
             </a:lvl1pPr>
-            <a:lvl2pPr marL="342900" indent="0">
+            <a:lvl2pPr marL="457200" indent="0">
+              <a:buNone/>
+              <a:defRPr sz="1200"/>
+            </a:lvl2pPr>
+            <a:lvl3pPr marL="914400" indent="0">
+              <a:buNone/>
+              <a:defRPr sz="1000"/>
+            </a:lvl3pPr>
+            <a:lvl4pPr marL="1371600" indent="0">
               <a:buNone/>
               <a:defRPr sz="900"/>
-            </a:lvl2pPr>
-            <a:lvl3pPr marL="685800" indent="0">
-              <a:buNone/>
-              <a:defRPr sz="750"/>
-            </a:lvl3pPr>
-            <a:lvl4pPr marL="1028700" indent="0">
-              <a:buNone/>
-              <a:defRPr sz="675"/>
             </a:lvl4pPr>
-            <a:lvl5pPr marL="1371600" indent="0">
-              <a:buNone/>
-              <a:defRPr sz="675"/>
+            <a:lvl5pPr marL="1828800" indent="0">
+              <a:buNone/>
+              <a:defRPr sz="900"/>
             </a:lvl5pPr>
-            <a:lvl6pPr marL="1714500" indent="0">
-              <a:buNone/>
-              <a:defRPr sz="675"/>
+            <a:lvl6pPr marL="2286000" indent="0">
+              <a:buNone/>
+              <a:defRPr sz="900"/>
             </a:lvl6pPr>
-            <a:lvl7pPr marL="2057400" indent="0">
-              <a:buNone/>
-              <a:defRPr sz="675"/>
+            <a:lvl7pPr marL="2743200" indent="0">
+              <a:buNone/>
+              <a:defRPr sz="900"/>
             </a:lvl7pPr>
-            <a:lvl8pPr marL="2400300" indent="0">
-              <a:buNone/>
-              <a:defRPr sz="675"/>
+            <a:lvl8pPr marL="3200400" indent="0">
+              <a:buNone/>
+              <a:defRPr sz="900"/>
             </a:lvl8pPr>
-            <a:lvl9pPr marL="2743200" indent="0">
-              <a:buNone/>
-              <a:defRPr sz="675"/>
+            <a:lvl9pPr marL="3657600" indent="0">
+              <a:buNone/>
+              <a:defRPr sz="900"/>
             </a:lvl9pPr>
           </a:lstStyle>
           <a:p>
             <a:pPr lvl="0"/>
             <a:r>
-              <a:rPr lang="en-US"/>
+              <a:rPr lang="en-US" smtClean="0"/>
               <a:t>Click to edit Master text styles</a:t>
             </a:r>
           </a:p>
@@ -2254,7 +2272,7 @@
           <a:p>
             <a:fld id="{241EB5C9-1307-BA42-ABA2-0BC069CD8E7F}" type="datetimeFigureOut">
               <a:rPr lang="en-US" smtClean="0"/>
-              <a:t>1/2/22</a:t>
+              <a:t>4/5/2019</a:t>
             </a:fld>
             <a:endParaRPr lang="en-US"/>
           </a:p>
@@ -2344,22 +2362,23 @@
         </p:nvSpPr>
         <p:spPr>
           <a:xfrm>
-            <a:off x="1792288" y="3600450"/>
-            <a:ext cx="5486400" cy="425054"/>
+            <a:off x="1792288" y="4800600"/>
+            <a:ext cx="5486400" cy="566738"/>
           </a:xfrm>
         </p:spPr>
         <p:txBody>
           <a:bodyPr anchor="b"/>
           <a:lstStyle>
             <a:lvl1pPr algn="l">
-              <a:defRPr sz="1500" b="1"/>
+              <a:defRPr sz="2000" b="1"/>
             </a:lvl1pPr>
           </a:lstStyle>
           <a:p>
             <a:r>
-              <a:rPr lang="en-US"/>
+              <a:rPr lang="en-US" smtClean="0"/>
               <a:t>Click to edit Master title style</a:t>
             </a:r>
+            <a:endParaRPr lang="en-US"/>
           </a:p>
         </p:txBody>
       </p:sp>
@@ -2375,8 +2394,8 @@
         </p:nvSpPr>
         <p:spPr>
           <a:xfrm>
-            <a:off x="1792288" y="459581"/>
-            <a:ext cx="5486400" cy="3086100"/>
+            <a:off x="1792288" y="612775"/>
+            <a:ext cx="5486400" cy="4114800"/>
           </a:xfrm>
         </p:spPr>
         <p:txBody>
@@ -2384,39 +2403,39 @@
           <a:lstStyle>
             <a:lvl1pPr marL="0" indent="0">
               <a:buNone/>
+              <a:defRPr sz="3200"/>
+            </a:lvl1pPr>
+            <a:lvl2pPr marL="457200" indent="0">
+              <a:buNone/>
+              <a:defRPr sz="2800"/>
+            </a:lvl2pPr>
+            <a:lvl3pPr marL="914400" indent="0">
+              <a:buNone/>
               <a:defRPr sz="2400"/>
-            </a:lvl1pPr>
-            <a:lvl2pPr marL="342900" indent="0">
-              <a:buNone/>
-              <a:defRPr sz="2100"/>
-            </a:lvl2pPr>
-            <a:lvl3pPr marL="685800" indent="0">
-              <a:buNone/>
-              <a:defRPr sz="1800"/>
             </a:lvl3pPr>
-            <a:lvl4pPr marL="1028700" indent="0">
-              <a:buNone/>
-              <a:defRPr sz="1500"/>
+            <a:lvl4pPr marL="1371600" indent="0">
+              <a:buNone/>
+              <a:defRPr sz="2000"/>
             </a:lvl4pPr>
-            <a:lvl5pPr marL="1371600" indent="0">
-              <a:buNone/>
-              <a:defRPr sz="1500"/>
+            <a:lvl5pPr marL="1828800" indent="0">
+              <a:buNone/>
+              <a:defRPr sz="2000"/>
             </a:lvl5pPr>
-            <a:lvl6pPr marL="1714500" indent="0">
-              <a:buNone/>
-              <a:defRPr sz="1500"/>
+            <a:lvl6pPr marL="2286000" indent="0">
+              <a:buNone/>
+              <a:defRPr sz="2000"/>
             </a:lvl6pPr>
-            <a:lvl7pPr marL="2057400" indent="0">
-              <a:buNone/>
-              <a:defRPr sz="1500"/>
+            <a:lvl7pPr marL="2743200" indent="0">
+              <a:buNone/>
+              <a:defRPr sz="2000"/>
             </a:lvl7pPr>
-            <a:lvl8pPr marL="2400300" indent="0">
-              <a:buNone/>
-              <a:defRPr sz="1500"/>
+            <a:lvl8pPr marL="3200400" indent="0">
+              <a:buNone/>
+              <a:defRPr sz="2000"/>
             </a:lvl8pPr>
-            <a:lvl9pPr marL="2743200" indent="0">
-              <a:buNone/>
-              <a:defRPr sz="1500"/>
+            <a:lvl9pPr marL="3657600" indent="0">
+              <a:buNone/>
+              <a:defRPr sz="2000"/>
             </a:lvl9pPr>
           </a:lstStyle>
           <a:p>
@@ -2436,8 +2455,8 @@
         </p:nvSpPr>
         <p:spPr>
           <a:xfrm>
-            <a:off x="1792288" y="4025503"/>
-            <a:ext cx="5486400" cy="603647"/>
+            <a:off x="1792288" y="5367338"/>
+            <a:ext cx="5486400" cy="804862"/>
           </a:xfrm>
         </p:spPr>
         <p:txBody>
@@ -2445,45 +2464,45 @@
           <a:lstStyle>
             <a:lvl1pPr marL="0" indent="0">
               <a:buNone/>
-              <a:defRPr sz="1050"/>
+              <a:defRPr sz="1400"/>
             </a:lvl1pPr>
-            <a:lvl2pPr marL="342900" indent="0">
+            <a:lvl2pPr marL="457200" indent="0">
+              <a:buNone/>
+              <a:defRPr sz="1200"/>
+            </a:lvl2pPr>
+            <a:lvl3pPr marL="914400" indent="0">
+              <a:buNone/>
+              <a:defRPr sz="1000"/>
+            </a:lvl3pPr>
+            <a:lvl4pPr marL="1371600" indent="0">
               <a:buNone/>
               <a:defRPr sz="900"/>
-            </a:lvl2pPr>
-            <a:lvl3pPr marL="685800" indent="0">
-              <a:buNone/>
-              <a:defRPr sz="750"/>
-            </a:lvl3pPr>
-            <a:lvl4pPr marL="1028700" indent="0">
-              <a:buNone/>
-              <a:defRPr sz="675"/>
             </a:lvl4pPr>
-            <a:lvl5pPr marL="1371600" indent="0">
-              <a:buNone/>
-              <a:defRPr sz="675"/>
+            <a:lvl5pPr marL="1828800" indent="0">
+              <a:buNone/>
+              <a:defRPr sz="900"/>
             </a:lvl5pPr>
-            <a:lvl6pPr marL="1714500" indent="0">
-              <a:buNone/>
-              <a:defRPr sz="675"/>
+            <a:lvl6pPr marL="2286000" indent="0">
+              <a:buNone/>
+              <a:defRPr sz="900"/>
             </a:lvl6pPr>
-            <a:lvl7pPr marL="2057400" indent="0">
-              <a:buNone/>
-              <a:defRPr sz="675"/>
+            <a:lvl7pPr marL="2743200" indent="0">
+              <a:buNone/>
+              <a:defRPr sz="900"/>
             </a:lvl7pPr>
-            <a:lvl8pPr marL="2400300" indent="0">
-              <a:buNone/>
-              <a:defRPr sz="675"/>
+            <a:lvl8pPr marL="3200400" indent="0">
+              <a:buNone/>
+              <a:defRPr sz="900"/>
             </a:lvl8pPr>
-            <a:lvl9pPr marL="2743200" indent="0">
-              <a:buNone/>
-              <a:defRPr sz="675"/>
+            <a:lvl9pPr marL="3657600" indent="0">
+              <a:buNone/>
+              <a:defRPr sz="900"/>
             </a:lvl9pPr>
           </a:lstStyle>
           <a:p>
             <a:pPr lvl="0"/>
             <a:r>
-              <a:rPr lang="en-US"/>
+              <a:rPr lang="en-US" smtClean="0"/>
               <a:t>Click to edit Master text styles</a:t>
             </a:r>
           </a:p>
@@ -2506,7 +2525,7 @@
           <a:p>
             <a:fld id="{241EB5C9-1307-BA42-ABA2-0BC069CD8E7F}" type="datetimeFigureOut">
               <a:rPr lang="en-US" smtClean="0"/>
-              <a:t>1/2/22</a:t>
+              <a:t>4/5/2019</a:t>
             </a:fld>
             <a:endParaRPr lang="en-US"/>
           </a:p>
@@ -2568,7 +2587,7 @@
 </file>
 
 <file path=ppt/slideMasters/slideMaster1.xml><?xml version="1.0" encoding="utf-8"?>
-<p:sldMaster xmlns:a="http://schemas.openxmlformats.org/drawingml/2006/main" xmlns:p="http://schemas.openxmlformats.org/presentationml/2006/main" xmlns:r="http://schemas.openxmlformats.org/officeDocument/2006/relationships">
+<p:sldMaster xmlns:a="http://schemas.openxmlformats.org/drawingml/2006/main" xmlns:r="http://schemas.openxmlformats.org/officeDocument/2006/relationships" xmlns:p="http://schemas.openxmlformats.org/presentationml/2006/main">
   <p:cSld>
     <p:bg>
       <p:bgRef idx="1001">
@@ -2601,23 +2620,24 @@
         </p:nvSpPr>
         <p:spPr>
           <a:xfrm>
-            <a:off x="457200" y="205979"/>
-            <a:ext cx="8229600" cy="857250"/>
+            <a:off x="457200" y="274638"/>
+            <a:ext cx="8229600" cy="1143000"/>
           </a:xfrm>
           <a:prstGeom prst="rect">
             <a:avLst/>
           </a:prstGeom>
         </p:spPr>
         <p:txBody>
-          <a:bodyPr anchor="ctr" bIns="45720" lIns="91440" rIns="91440" rtlCol="0" tIns="45720" vert="horz">
+          <a:bodyPr vert="horz" lIns="91440" tIns="45720" rIns="91440" bIns="45720" rtlCol="0" anchor="ctr">
             <a:normAutofit/>
           </a:bodyPr>
           <a:lstStyle/>
           <a:p>
             <a:r>
-              <a:rPr lang="en-US"/>
+              <a:rPr lang="en-US" smtClean="0"/>
               <a:t>Click to edit Master title style</a:t>
             </a:r>
+            <a:endParaRPr lang="en-US"/>
           </a:p>
         </p:txBody>
       </p:sp>
@@ -2628,57 +2648,58 @@
             <a:spLocks noGrp="1"/>
           </p:cNvSpPr>
           <p:nvPr>
-            <p:ph idx="1" type="body"/>
+            <p:ph type="body" idx="1"/>
           </p:nvPr>
         </p:nvSpPr>
         <p:spPr>
           <a:xfrm>
-            <a:off x="457200" y="1200151"/>
-            <a:ext cx="8229600" cy="3394472"/>
+            <a:off x="457200" y="1600200"/>
+            <a:ext cx="8229600" cy="4525963"/>
           </a:xfrm>
           <a:prstGeom prst="rect">
             <a:avLst/>
           </a:prstGeom>
         </p:spPr>
         <p:txBody>
-          <a:bodyPr bIns="45720" lIns="91440" rIns="91440" rtlCol="0" tIns="45720" vert="horz">
+          <a:bodyPr vert="horz" lIns="91440" tIns="45720" rIns="91440" bIns="45720" rtlCol="0">
             <a:normAutofit/>
           </a:bodyPr>
           <a:lstStyle/>
           <a:p>
             <a:pPr lvl="0"/>
             <a:r>
-              <a:rPr lang="en-US"/>
+              <a:rPr lang="en-US" smtClean="0"/>
               <a:t>Click to edit Master text styles</a:t>
             </a:r>
           </a:p>
           <a:p>
             <a:pPr lvl="1"/>
             <a:r>
-              <a:rPr lang="en-US"/>
+              <a:rPr lang="en-US" smtClean="0"/>
               <a:t>Second level</a:t>
             </a:r>
           </a:p>
           <a:p>
             <a:pPr lvl="2"/>
             <a:r>
-              <a:rPr lang="en-US"/>
+              <a:rPr lang="en-US" smtClean="0"/>
               <a:t>Third level</a:t>
             </a:r>
           </a:p>
           <a:p>
             <a:pPr lvl="3"/>
             <a:r>
-              <a:rPr lang="en-US"/>
+              <a:rPr lang="en-US" smtClean="0"/>
               <a:t>Fourth level</a:t>
             </a:r>
           </a:p>
           <a:p>
             <a:pPr lvl="4"/>
             <a:r>
-              <a:rPr lang="en-US"/>
+              <a:rPr lang="en-US" smtClean="0"/>
               <a:t>Fifth level</a:t>
             </a:r>
+            <a:endParaRPr lang="en-US"/>
           </a:p>
         </p:txBody>
       </p:sp>
@@ -2689,23 +2710,23 @@
             <a:spLocks noGrp="1"/>
           </p:cNvSpPr>
           <p:nvPr>
-            <p:ph idx="2" sz="half" type="dt"/>
+            <p:ph type="dt" sz="half" idx="2"/>
           </p:nvPr>
         </p:nvSpPr>
         <p:spPr>
           <a:xfrm>
-            <a:off x="457200" y="4767263"/>
-            <a:ext cx="2133600" cy="273844"/>
+            <a:off x="457200" y="6356350"/>
+            <a:ext cx="2133600" cy="365125"/>
           </a:xfrm>
           <a:prstGeom prst="rect">
             <a:avLst/>
           </a:prstGeom>
         </p:spPr>
         <p:txBody>
-          <a:bodyPr anchor="ctr" bIns="45720" lIns="91440" rIns="91440" rtlCol="0" tIns="45720" vert="horz"/>
+          <a:bodyPr vert="horz" lIns="91440" tIns="45720" rIns="91440" bIns="45720" rtlCol="0" anchor="ctr"/>
           <a:lstStyle>
             <a:lvl1pPr algn="l">
-              <a:defRPr sz="900">
+              <a:defRPr sz="1200">
                 <a:solidFill>
                   <a:schemeClr val="tx1">
                     <a:tint val="75000"/>
@@ -2717,7 +2738,7 @@
           <a:p>
             <a:fld id="{241EB5C9-1307-BA42-ABA2-0BC069CD8E7F}" type="datetimeFigureOut">
               <a:rPr lang="en-US" smtClean="0"/>
-              <a:t>1/2/22</a:t>
+              <a:t>4/5/2019</a:t>
             </a:fld>
             <a:endParaRPr lang="en-US"/>
           </a:p>
@@ -2730,23 +2751,23 @@
             <a:spLocks noGrp="1"/>
           </p:cNvSpPr>
           <p:nvPr>
-            <p:ph idx="3" sz="quarter" type="ftr"/>
+            <p:ph type="ftr" sz="quarter" idx="3"/>
           </p:nvPr>
         </p:nvSpPr>
         <p:spPr>
           <a:xfrm>
-            <a:off x="3124200" y="4767263"/>
-            <a:ext cx="2895600" cy="273844"/>
+            <a:off x="3124200" y="6356350"/>
+            <a:ext cx="2895600" cy="365125"/>
           </a:xfrm>
           <a:prstGeom prst="rect">
             <a:avLst/>
           </a:prstGeom>
         </p:spPr>
         <p:txBody>
-          <a:bodyPr anchor="ctr" bIns="45720" lIns="91440" rIns="91440" rtlCol="0" tIns="45720" vert="horz"/>
+          <a:bodyPr vert="horz" lIns="91440" tIns="45720" rIns="91440" bIns="45720" rtlCol="0" anchor="ctr"/>
           <a:lstStyle>
             <a:lvl1pPr algn="ctr">
-              <a:defRPr sz="900">
+              <a:defRPr sz="1200">
                 <a:solidFill>
                   <a:schemeClr val="tx1">
                     <a:tint val="75000"/>
@@ -2767,23 +2788,23 @@
             <a:spLocks noGrp="1"/>
           </p:cNvSpPr>
           <p:nvPr>
-            <p:ph idx="4" sz="quarter" type="sldNum"/>
+            <p:ph type="sldNum" sz="quarter" idx="4"/>
           </p:nvPr>
         </p:nvSpPr>
         <p:spPr>
           <a:xfrm>
-            <a:off x="6553200" y="4767263"/>
-            <a:ext cx="2133600" cy="273844"/>
+            <a:off x="6553200" y="6356350"/>
+            <a:ext cx="2133600" cy="365125"/>
           </a:xfrm>
           <a:prstGeom prst="rect">
             <a:avLst/>
           </a:prstGeom>
         </p:spPr>
         <p:txBody>
-          <a:bodyPr anchor="ctr" bIns="45720" lIns="91440" rIns="91440" rtlCol="0" tIns="45720" vert="horz"/>
+          <a:bodyPr vert="horz" lIns="91440" tIns="45720" rIns="91440" bIns="45720" rtlCol="0" anchor="ctr"/>
           <a:lstStyle>
             <a:lvl1pPr algn="r">
-              <a:defRPr sz="900">
+              <a:defRPr sz="1200">
                 <a:solidFill>
                   <a:schemeClr val="tx1">
                     <a:tint val="75000"/>
@@ -2808,7 +2829,7 @@
       </p:ext>
     </p:extLst>
   </p:cSld>
-  <p:clrMap accent1="accent1" accent2="accent2" accent3="accent3" accent4="accent4" accent5="accent5" accent6="accent6" bg1="lt1" bg2="lt2" folHlink="folHlink" hlink="hlink" tx1="dk1" tx2="dk2"/>
+  <p:clrMap bg1="lt1" tx1="dk1" bg2="lt2" tx2="dk2" accent1="accent1" accent2="accent2" accent3="accent3" accent4="accent4" accent5="accent5" accent6="accent6" hlink="hlink" folHlink="folHlink"/>
   <p:sldLayoutIdLst>
     <p:sldLayoutId id="2147483649" r:id="rId1"/>
     <p:sldLayoutId id="2147483650" r:id="rId2"/>
@@ -2824,12 +2845,12 @@
   </p:sldLayoutIdLst>
   <p:txStyles>
     <p:titleStyle>
-      <a:lvl1pPr algn="ctr" defTabSz="342900" eaLnBrk="1" hangingPunct="1" latinLnBrk="0" rtl="0">
+      <a:lvl1pPr algn="ctr" defTabSz="457200" rtl="0" eaLnBrk="1" latinLnBrk="0" hangingPunct="1">
         <a:spcBef>
           <a:spcPct val="0"/>
         </a:spcBef>
         <a:buNone/>
-        <a:defRPr kern="1200" sz="3300">
+        <a:defRPr sz="4400" kern="1200">
           <a:solidFill>
             <a:schemeClr val="tx1"/>
           </a:solidFill>
@@ -2840,13 +2861,13 @@
       </a:lvl1pPr>
     </p:titleStyle>
     <p:bodyStyle>
-      <a:lvl1pPr algn="l" defTabSz="342900" eaLnBrk="1" hangingPunct="1" indent="-342900" latinLnBrk="0" marL="342900" rtl="0">
+      <a:lvl1pPr marL="342900" indent="-342900" algn="l" defTabSz="457200" rtl="0" eaLnBrk="1" latinLnBrk="0" hangingPunct="1">
         <a:spcBef>
           <a:spcPct val="20000"/>
         </a:spcBef>
         <a:buFont typeface="Arial"/>
         <a:buChar char="•"/>
-        <a:defRPr kern="1200" sz="2400">
+        <a:defRPr sz="3200" kern="1200">
           <a:solidFill>
             <a:schemeClr val="tx1"/>
           </a:solidFill>
@@ -2855,13 +2876,13 @@
           <a:cs typeface="+mn-cs"/>
         </a:defRPr>
       </a:lvl1pPr>
-      <a:lvl2pPr algn="l" defTabSz="342900" eaLnBrk="1" hangingPunct="1" indent="-342900" latinLnBrk="0" marL="685800" rtl="0">
+      <a:lvl2pPr marL="742950" indent="-285750" algn="l" defTabSz="457200" rtl="0" eaLnBrk="1" latinLnBrk="0" hangingPunct="1">
         <a:spcBef>
           <a:spcPct val="20000"/>
         </a:spcBef>
         <a:buFont typeface="Arial"/>
         <a:buChar char="–"/>
-        <a:defRPr kern="1200" sz="2100">
+        <a:defRPr sz="2800" kern="1200">
           <a:solidFill>
             <a:schemeClr val="tx1"/>
           </a:solidFill>
@@ -2870,13 +2891,13 @@
           <a:cs typeface="+mn-cs"/>
         </a:defRPr>
       </a:lvl2pPr>
-      <a:lvl3pPr algn="l" defTabSz="342900" eaLnBrk="1" hangingPunct="1" indent="-342900" latinLnBrk="0" marL="1028700" rtl="0">
+      <a:lvl3pPr marL="1143000" indent="-228600" algn="l" defTabSz="457200" rtl="0" eaLnBrk="1" latinLnBrk="0" hangingPunct="1">
         <a:spcBef>
           <a:spcPct val="20000"/>
         </a:spcBef>
         <a:buFont typeface="Arial"/>
         <a:buChar char="•"/>
-        <a:defRPr kern="1200" sz="1800">
+        <a:defRPr sz="2400" kern="1200">
           <a:solidFill>
             <a:schemeClr val="tx1"/>
           </a:solidFill>
@@ -2885,13 +2906,13 @@
           <a:cs typeface="+mn-cs"/>
         </a:defRPr>
       </a:lvl3pPr>
-      <a:lvl4pPr algn="l" defTabSz="342900" eaLnBrk="1" hangingPunct="1" indent="-342900" latinLnBrk="0" marL="1371600" rtl="0">
+      <a:lvl4pPr marL="1600200" indent="-228600" algn="l" defTabSz="457200" rtl="0" eaLnBrk="1" latinLnBrk="0" hangingPunct="1">
         <a:spcBef>
           <a:spcPct val="20000"/>
         </a:spcBef>
         <a:buFont typeface="Arial"/>
         <a:buChar char="–"/>
-        <a:defRPr kern="1200" sz="1500">
+        <a:defRPr sz="2000" kern="1200">
           <a:solidFill>
             <a:schemeClr val="tx1"/>
           </a:solidFill>
@@ -2900,13 +2921,13 @@
           <a:cs typeface="+mn-cs"/>
         </a:defRPr>
       </a:lvl4pPr>
-      <a:lvl5pPr algn="l" defTabSz="342900" eaLnBrk="1" hangingPunct="1" indent="-342900" latinLnBrk="0" marL="1714500" rtl="0">
+      <a:lvl5pPr marL="2057400" indent="-228600" algn="l" defTabSz="457200" rtl="0" eaLnBrk="1" latinLnBrk="0" hangingPunct="1">
         <a:spcBef>
           <a:spcPct val="20000"/>
         </a:spcBef>
         <a:buFont typeface="Arial"/>
         <a:buChar char="»"/>
-        <a:defRPr kern="1200" sz="1500">
+        <a:defRPr sz="2000" kern="1200">
           <a:solidFill>
             <a:schemeClr val="tx1"/>
           </a:solidFill>
@@ -2915,13 +2936,13 @@
           <a:cs typeface="+mn-cs"/>
         </a:defRPr>
       </a:lvl5pPr>
-      <a:lvl6pPr algn="l" defTabSz="342900" eaLnBrk="1" hangingPunct="1" indent="-342900" latinLnBrk="0" marL="2057400" rtl="0">
+      <a:lvl6pPr marL="2514600" indent="-228600" algn="l" defTabSz="457200" rtl="0" eaLnBrk="1" latinLnBrk="0" hangingPunct="1">
         <a:spcBef>
           <a:spcPct val="20000"/>
         </a:spcBef>
         <a:buFont typeface="Arial"/>
         <a:buChar char="•"/>
-        <a:defRPr kern="1200" sz="1500">
+        <a:defRPr sz="2000" kern="1200">
           <a:solidFill>
             <a:schemeClr val="tx1"/>
           </a:solidFill>
@@ -2930,13 +2951,13 @@
           <a:cs typeface="+mn-cs"/>
         </a:defRPr>
       </a:lvl6pPr>
-      <a:lvl7pPr algn="l" defTabSz="342900" eaLnBrk="1" hangingPunct="1" indent="-342900" latinLnBrk="0" marL="2400300" rtl="0">
+      <a:lvl7pPr marL="2971800" indent="-228600" algn="l" defTabSz="457200" rtl="0" eaLnBrk="1" latinLnBrk="0" hangingPunct="1">
         <a:spcBef>
           <a:spcPct val="20000"/>
         </a:spcBef>
         <a:buFont typeface="Arial"/>
         <a:buChar char="•"/>
-        <a:defRPr kern="1200" sz="1500">
+        <a:defRPr sz="2000" kern="1200">
           <a:solidFill>
             <a:schemeClr val="tx1"/>
           </a:solidFill>
@@ -2945,13 +2966,13 @@
           <a:cs typeface="+mn-cs"/>
         </a:defRPr>
       </a:lvl7pPr>
-      <a:lvl8pPr algn="l" defTabSz="342900" eaLnBrk="1" hangingPunct="1" indent="-342900" latinLnBrk="0" marL="2743200" rtl="0">
+      <a:lvl8pPr marL="3429000" indent="-228600" algn="l" defTabSz="457200" rtl="0" eaLnBrk="1" latinLnBrk="0" hangingPunct="1">
         <a:spcBef>
           <a:spcPct val="20000"/>
         </a:spcBef>
         <a:buFont typeface="Arial"/>
         <a:buChar char="•"/>
-        <a:defRPr kern="1200" sz="1500">
+        <a:defRPr sz="2000" kern="1200">
           <a:solidFill>
             <a:schemeClr val="tx1"/>
           </a:solidFill>
@@ -2960,13 +2981,13 @@
           <a:cs typeface="+mn-cs"/>
         </a:defRPr>
       </a:lvl8pPr>
-      <a:lvl9pPr algn="l" defTabSz="342900" eaLnBrk="1" hangingPunct="1" indent="-342900" latinLnBrk="0" marL="3086100" rtl="0">
+      <a:lvl9pPr marL="3886200" indent="-228600" algn="l" defTabSz="457200" rtl="0" eaLnBrk="1" latinLnBrk="0" hangingPunct="1">
         <a:spcBef>
           <a:spcPct val="20000"/>
         </a:spcBef>
         <a:buFont typeface="Arial"/>
         <a:buChar char="•"/>
-        <a:defRPr kern="1200" sz="1500">
+        <a:defRPr sz="2000" kern="1200">
           <a:solidFill>
             <a:schemeClr val="tx1"/>
           </a:solidFill>
@@ -2980,8 +3001,8 @@
       <a:defPPr>
         <a:defRPr lang="en-US"/>
       </a:defPPr>
-      <a:lvl1pPr algn="l" defTabSz="342900" eaLnBrk="1" hangingPunct="1" latinLnBrk="0" marL="0" rtl="0">
-        <a:defRPr kern="1200" sz="1350">
+      <a:lvl1pPr marL="0" algn="l" defTabSz="457200" rtl="0" eaLnBrk="1" latinLnBrk="0" hangingPunct="1">
+        <a:defRPr sz="1800" kern="1200">
           <a:solidFill>
             <a:schemeClr val="tx1"/>
           </a:solidFill>
@@ -2990,8 +3011,8 @@
           <a:cs typeface="+mn-cs"/>
         </a:defRPr>
       </a:lvl1pPr>
-      <a:lvl2pPr algn="l" defTabSz="342900" eaLnBrk="1" hangingPunct="1" latinLnBrk="0" marL="342900" rtl="0">
-        <a:defRPr kern="1200" sz="1350">
+      <a:lvl2pPr marL="457200" algn="l" defTabSz="457200" rtl="0" eaLnBrk="1" latinLnBrk="0" hangingPunct="1">
+        <a:defRPr sz="1800" kern="1200">
           <a:solidFill>
             <a:schemeClr val="tx1"/>
           </a:solidFill>
@@ -3000,8 +3021,8 @@
           <a:cs typeface="+mn-cs"/>
         </a:defRPr>
       </a:lvl2pPr>
-      <a:lvl3pPr algn="l" defTabSz="342900" eaLnBrk="1" hangingPunct="1" latinLnBrk="0" marL="685800" rtl="0">
-        <a:defRPr kern="1200" sz="1350">
+      <a:lvl3pPr marL="914400" algn="l" defTabSz="457200" rtl="0" eaLnBrk="1" latinLnBrk="0" hangingPunct="1">
+        <a:defRPr sz="1800" kern="1200">
           <a:solidFill>
             <a:schemeClr val="tx1"/>
           </a:solidFill>
@@ -3010,8 +3031,8 @@
           <a:cs typeface="+mn-cs"/>
         </a:defRPr>
       </a:lvl3pPr>
-      <a:lvl4pPr algn="l" defTabSz="342900" eaLnBrk="1" hangingPunct="1" latinLnBrk="0" marL="1028700" rtl="0">
-        <a:defRPr kern="1200" sz="1350">
+      <a:lvl4pPr marL="1371600" algn="l" defTabSz="457200" rtl="0" eaLnBrk="1" latinLnBrk="0" hangingPunct="1">
+        <a:defRPr sz="1800" kern="1200">
           <a:solidFill>
             <a:schemeClr val="tx1"/>
           </a:solidFill>
@@ -3020,8 +3041,8 @@
           <a:cs typeface="+mn-cs"/>
         </a:defRPr>
       </a:lvl4pPr>
-      <a:lvl5pPr algn="l" defTabSz="342900" eaLnBrk="1" hangingPunct="1" latinLnBrk="0" marL="1371600" rtl="0">
-        <a:defRPr kern="1200" sz="1350">
+      <a:lvl5pPr marL="1828800" algn="l" defTabSz="457200" rtl="0" eaLnBrk="1" latinLnBrk="0" hangingPunct="1">
+        <a:defRPr sz="1800" kern="1200">
           <a:solidFill>
             <a:schemeClr val="tx1"/>
           </a:solidFill>
@@ -3030,8 +3051,8 @@
           <a:cs typeface="+mn-cs"/>
         </a:defRPr>
       </a:lvl5pPr>
-      <a:lvl6pPr algn="l" defTabSz="342900" eaLnBrk="1" hangingPunct="1" latinLnBrk="0" marL="1714500" rtl="0">
-        <a:defRPr kern="1200" sz="1350">
+      <a:lvl6pPr marL="2286000" algn="l" defTabSz="457200" rtl="0" eaLnBrk="1" latinLnBrk="0" hangingPunct="1">
+        <a:defRPr sz="1800" kern="1200">
           <a:solidFill>
             <a:schemeClr val="tx1"/>
           </a:solidFill>
@@ -3040,8 +3061,8 @@
           <a:cs typeface="+mn-cs"/>
         </a:defRPr>
       </a:lvl6pPr>
-      <a:lvl7pPr algn="l" defTabSz="342900" eaLnBrk="1" hangingPunct="1" latinLnBrk="0" marL="2057400" rtl="0">
-        <a:defRPr kern="1200" sz="1350">
+      <a:lvl7pPr marL="2743200" algn="l" defTabSz="457200" rtl="0" eaLnBrk="1" latinLnBrk="0" hangingPunct="1">
+        <a:defRPr sz="1800" kern="1200">
           <a:solidFill>
             <a:schemeClr val="tx1"/>
           </a:solidFill>
@@ -3050,8 +3071,8 @@
           <a:cs typeface="+mn-cs"/>
         </a:defRPr>
       </a:lvl7pPr>
-      <a:lvl8pPr algn="l" defTabSz="342900" eaLnBrk="1" hangingPunct="1" latinLnBrk="0" marL="2400300" rtl="0">
-        <a:defRPr kern="1200" sz="1350">
+      <a:lvl8pPr marL="3200400" algn="l" defTabSz="457200" rtl="0" eaLnBrk="1" latinLnBrk="0" hangingPunct="1">
+        <a:defRPr sz="1800" kern="1200">
           <a:solidFill>
             <a:schemeClr val="tx1"/>
           </a:solidFill>
@@ -3060,8 +3081,8 @@
           <a:cs typeface="+mn-cs"/>
         </a:defRPr>
       </a:lvl8pPr>
-      <a:lvl9pPr algn="l" defTabSz="342900" eaLnBrk="1" hangingPunct="1" latinLnBrk="0" marL="2743200" rtl="0">
-        <a:defRPr kern="1200" sz="1350">
+      <a:lvl9pPr marL="3657600" algn="l" defTabSz="457200" rtl="0" eaLnBrk="1" latinLnBrk="0" hangingPunct="1">
+        <a:defRPr sz="1800" kern="1200">
           <a:solidFill>
             <a:schemeClr val="tx1"/>
           </a:solidFill>
@@ -3107,12 +3128,28 @@
           <a:bodyPr/>
           <a:lstStyle/>
           <a:p>
-            <a:pPr lvl="0" indent="0" marL="0">
+            <a:pPr lvl="0" marL="0" indent="0">
               <a:buNone/>
             </a:pPr>
             <a:r>
               <a:rPr/>
-              <a:t>Техника для кухни</a:t>
+              <a:t>Техника</a:t>
+            </a:r>
+            <a:r>
+              <a:rPr/>
+              <a:t> </a:t>
+            </a:r>
+            <a:r>
+              <a:rPr/>
+              <a:t>для</a:t>
+            </a:r>
+            <a:r>
+              <a:rPr/>
+              <a:t> </a:t>
+            </a:r>
+            <a:r>
+              <a:rPr/>
+              <a:t>кухни</a:t>
             </a:r>
           </a:p>
         </p:txBody>
@@ -3133,8 +3170,8 @@
         </p:blipFill>
         <p:spPr bwMode="auto">
           <a:xfrm>
-            <a:off x="1955800" y="1193800"/>
-            <a:ext cx="5232400" cy="3390900"/>
+            <a:off x="1079500" y="1600200"/>
+            <a:ext cx="6985000" cy="4521200"/>
           </a:xfrm>
           <a:prstGeom prst="rect">
             <a:avLst/>
@@ -3184,12 +3221,20 @@
           <a:bodyPr/>
           <a:lstStyle/>
           <a:p>
-            <a:pPr lvl="0" indent="0" marL="0">
+            <a:pPr lvl="0" marL="0" indent="0">
               <a:buNone/>
             </a:pPr>
             <a:r>
               <a:rPr/>
-              <a:t>мини-печь StarWind</a:t>
+              <a:t>мини-печь</a:t>
+            </a:r>
+            <a:r>
+              <a:rPr/>
+              <a:t> </a:t>
+            </a:r>
+            <a:r>
+              <a:rPr/>
+              <a:t>StarWind</a:t>
             </a:r>
           </a:p>
         </p:txBody>
@@ -3209,28 +3254,28 @@
           <a:bodyPr/>
           <a:lstStyle/>
           <a:p>
-            <a:pPr lvl="0"/>
+            <a:pPr lvl="1"/>
             <a:r>
               <a:rPr/>
               <a:t>вендор: StarWind</a:t>
             </a:r>
           </a:p>
           <a:p>
-            <a:pPr lvl="0"/>
+            <a:pPr lvl="1"/>
             <a:r>
               <a:rPr/>
               <a:t>модель: Мини-печь smo2003</a:t>
             </a:r>
           </a:p>
           <a:p>
-            <a:pPr lvl="0"/>
+            <a:pPr lvl="1"/>
             <a:r>
               <a:rPr/>
               <a:t>артикул: 13883932</a:t>
             </a:r>
           </a:p>
           <a:p>
-            <a:pPr lvl="0"/>
+            <a:pPr lvl="1"/>
             <a:r>
               <a:rPr/>
               <a:t>цена: 5597</a:t>
@@ -3240,7 +3285,7 @@
       </p:sp>
       <p:pic>
         <p:nvPicPr>
-          <p:cNvPr descr="fig:  pic/13883932.png" id="0" name="Picture 1"/>
+          <p:cNvPr descr="pic/13883932.png" id="0" name="Picture 1"/>
           <p:cNvPicPr>
             <a:picLocks noGrp="1" noChangeAspect="1"/>
           </p:cNvPicPr>
@@ -3254,8 +3299,8 @@
         </p:blipFill>
         <p:spPr bwMode="auto">
           <a:xfrm>
-            <a:off x="5588000" y="1193800"/>
-            <a:ext cx="2159000" cy="2882900"/>
+            <a:off x="5156200" y="1600200"/>
+            <a:ext cx="3009900" cy="4013200"/>
           </a:xfrm>
           <a:prstGeom prst="rect">
             <a:avLst/>
@@ -3276,7 +3321,7 @@
         </p:nvSpPr>
         <p:spPr>
           <a:xfrm>
-            <a:off x="4648200" y="4076700"/>
+            <a:off x="4648200" y="5613400"/>
             <a:ext cx="4038600" cy="508000"/>
           </a:xfrm>
           <a:prstGeom prst="rect">
@@ -3288,12 +3333,20 @@
           <a:bodyPr/>
           <a:lstStyle/>
           <a:p>
-            <a:pPr lvl="0" indent="0" marL="0" algn="ctr">
+            <a:pPr lvl="0" marL="0" indent="0" algn="ctr">
               <a:buNone/>
             </a:pPr>
             <a:r>
               <a:rPr/>
-              <a:t>фото товара</a:t>
+              <a:t>фото</a:t>
+            </a:r>
+            <a:r>
+              <a:rPr/>
+              <a:t> </a:t>
+            </a:r>
+            <a:r>
+              <a:rPr/>
+              <a:t>товара</a:t>
             </a:r>
           </a:p>
         </p:txBody>
@@ -3335,12 +3388,36 @@
           <a:bodyPr/>
           <a:lstStyle/>
           <a:p>
-            <a:pPr lvl="0" indent="0" marL="0">
+            <a:pPr lvl="0" marL="0" indent="0">
               <a:buNone/>
             </a:pPr>
             <a:r>
               <a:rPr/>
-              <a:t>Микроволновая печь соло 20MWS-711M/WS</a:t>
+              <a:t>Микроволновая</a:t>
+            </a:r>
+            <a:r>
+              <a:rPr/>
+              <a:t> </a:t>
+            </a:r>
+            <a:r>
+              <a:rPr/>
+              <a:t>печь</a:t>
+            </a:r>
+            <a:r>
+              <a:rPr/>
+              <a:t> </a:t>
+            </a:r>
+            <a:r>
+              <a:rPr/>
+              <a:t>соло</a:t>
+            </a:r>
+            <a:r>
+              <a:rPr/>
+              <a:t> </a:t>
+            </a:r>
+            <a:r>
+              <a:rPr/>
+              <a:t>20MWS-711M/WS</a:t>
             </a:r>
           </a:p>
         </p:txBody>
@@ -3360,28 +3437,28 @@
           <a:bodyPr/>
           <a:lstStyle/>
           <a:p>
-            <a:pPr lvl="0"/>
+            <a:pPr lvl="1"/>
             <a:r>
               <a:rPr/>
               <a:t>вендор: BBK</a:t>
             </a:r>
           </a:p>
           <a:p>
-            <a:pPr lvl="0"/>
+            <a:pPr lvl="1"/>
             <a:r>
               <a:rPr/>
               <a:t>модель: Микроволновая печь соло 20MWS-711M/WS</a:t>
             </a:r>
           </a:p>
           <a:p>
-            <a:pPr lvl="0"/>
+            <a:pPr lvl="1"/>
             <a:r>
               <a:rPr/>
               <a:t>артикул: 8483040</a:t>
             </a:r>
           </a:p>
           <a:p>
-            <a:pPr lvl="0"/>
+            <a:pPr lvl="1"/>
             <a:r>
               <a:rPr/>
               <a:t>цена: 4173</a:t>
@@ -3391,7 +3468,7 @@
       </p:sp>
       <p:pic>
         <p:nvPicPr>
-          <p:cNvPr descr="fig:  pic/8483040.png" id="0" name="Picture 1"/>
+          <p:cNvPr descr="pic/8483040.png" id="0" name="Picture 1"/>
           <p:cNvPicPr>
             <a:picLocks noGrp="1" noChangeAspect="1"/>
           </p:cNvPicPr>
@@ -3405,8 +3482,8 @@
         </p:blipFill>
         <p:spPr bwMode="auto">
           <a:xfrm>
-            <a:off x="5219700" y="1193800"/>
-            <a:ext cx="2908300" cy="2882900"/>
+            <a:off x="4648200" y="1600200"/>
+            <a:ext cx="4038600" cy="4013200"/>
           </a:xfrm>
           <a:prstGeom prst="rect">
             <a:avLst/>
@@ -3427,7 +3504,7 @@
         </p:nvSpPr>
         <p:spPr>
           <a:xfrm>
-            <a:off x="4648200" y="4076700"/>
+            <a:off x="4648200" y="5613400"/>
             <a:ext cx="4038600" cy="508000"/>
           </a:xfrm>
           <a:prstGeom prst="rect">
@@ -3439,12 +3516,20 @@
           <a:bodyPr/>
           <a:lstStyle/>
           <a:p>
-            <a:pPr lvl="0" indent="0" marL="0" algn="ctr">
+            <a:pPr lvl="0" marL="0" indent="0" algn="ctr">
               <a:buNone/>
             </a:pPr>
             <a:r>
               <a:rPr/>
-              <a:t>фото товара</a:t>
+              <a:t>фото</a:t>
+            </a:r>
+            <a:r>
+              <a:rPr/>
+              <a:t> </a:t>
+            </a:r>
+            <a:r>
+              <a:rPr/>
+              <a:t>товара</a:t>
             </a:r>
           </a:p>
         </p:txBody>
@@ -3772,265 +3857,4 @@
   </a:objectDefaults>
   <a:extraClrSchemeLst/>
 </a:theme>
-</file>
-
-<file path=ppt/theme/theme2.xml><?xml version="1.0" encoding="utf-8"?>
-<a:theme xmlns:a="http://schemas.openxmlformats.org/drawingml/2006/main" name="Office Theme">
-  <a:themeElements>
-    <a:clrScheme name="Office">
-      <a:dk1>
-        <a:sysClr val="windowText" lastClr="000000"/>
-      </a:dk1>
-      <a:lt1>
-        <a:sysClr val="window" lastClr="FFFFFF"/>
-      </a:lt1>
-      <a:dk2>
-        <a:srgbClr val="44546A"/>
-      </a:dk2>
-      <a:lt2>
-        <a:srgbClr val="E7E6E6"/>
-      </a:lt2>
-      <a:accent1>
-        <a:srgbClr val="5B9BD5"/>
-      </a:accent1>
-      <a:accent2>
-        <a:srgbClr val="ED7D31"/>
-      </a:accent2>
-      <a:accent3>
-        <a:srgbClr val="A5A5A5"/>
-      </a:accent3>
-      <a:accent4>
-        <a:srgbClr val="FFC000"/>
-      </a:accent4>
-      <a:accent5>
-        <a:srgbClr val="4472C4"/>
-      </a:accent5>
-      <a:accent6>
-        <a:srgbClr val="70AD47"/>
-      </a:accent6>
-      <a:hlink>
-        <a:srgbClr val="0563C1"/>
-      </a:hlink>
-      <a:folHlink>
-        <a:srgbClr val="954F72"/>
-      </a:folHlink>
-    </a:clrScheme>
-    <a:fontScheme name="Office">
-      <a:majorFont>
-        <a:latin typeface="Calibri Light" panose="020F0302020204030204"/>
-        <a:ea typeface=""/>
-        <a:cs typeface=""/>
-        <a:font script="Jpan" typeface="ＭＳ Ｐゴシック"/>
-        <a:font script="Hang" typeface="맑은 고딕"/>
-        <a:font script="Hans" typeface="宋体"/>
-        <a:font script="Hant" typeface="新細明體"/>
-        <a:font script="Arab" typeface="Times New Roman"/>
-        <a:font script="Hebr" typeface="Times New Roman"/>
-        <a:font script="Thai" typeface="Angsana New"/>
-        <a:font script="Ethi" typeface="Nyala"/>
-        <a:font script="Beng" typeface="Vrinda"/>
-        <a:font script="Gujr" typeface="Shruti"/>
-        <a:font script="Khmr" typeface="MoolBoran"/>
-        <a:font script="Knda" typeface="Tunga"/>
-        <a:font script="Guru" typeface="Raavi"/>
-        <a:font script="Cans" typeface="Euphemia"/>
-        <a:font script="Cher" typeface="Plantagenet Cherokee"/>
-        <a:font script="Yiii" typeface="Microsoft Yi Baiti"/>
-        <a:font script="Tibt" typeface="Microsoft Himalaya"/>
-        <a:font script="Thaa" typeface="MV Boli"/>
-        <a:font script="Deva" typeface="Mangal"/>
-        <a:font script="Telu" typeface="Gautami"/>
-        <a:font script="Taml" typeface="Latha"/>
-        <a:font script="Syrc" typeface="Estrangelo Edessa"/>
-        <a:font script="Orya" typeface="Kalinga"/>
-        <a:font script="Mlym" typeface="Kartika"/>
-        <a:font script="Laoo" typeface="DokChampa"/>
-        <a:font script="Sinh" typeface="Iskoola Pota"/>
-        <a:font script="Mong" typeface="Mongolian Baiti"/>
-        <a:font script="Viet" typeface="Times New Roman"/>
-        <a:font script="Uigh" typeface="Microsoft Uighur"/>
-        <a:font script="Geor" typeface="Sylfaen"/>
-      </a:majorFont>
-      <a:minorFont>
-        <a:latin typeface="Calibri" panose="020F0502020204030204"/>
-        <a:ea typeface=""/>
-        <a:cs typeface=""/>
-        <a:font script="Jpan" typeface="ＭＳ Ｐゴシック"/>
-        <a:font script="Hang" typeface="맑은 고딕"/>
-        <a:font script="Hans" typeface="宋体"/>
-        <a:font script="Hant" typeface="新細明體"/>
-        <a:font script="Arab" typeface="Arial"/>
-        <a:font script="Hebr" typeface="Arial"/>
-        <a:font script="Thai" typeface="Cordia New"/>
-        <a:font script="Ethi" typeface="Nyala"/>
-        <a:font script="Beng" typeface="Vrinda"/>
-        <a:font script="Gujr" typeface="Shruti"/>
-        <a:font script="Khmr" typeface="DaunPenh"/>
-        <a:font script="Knda" typeface="Tunga"/>
-        <a:font script="Guru" typeface="Raavi"/>
-        <a:font script="Cans" typeface="Euphemia"/>
-        <a:font script="Cher" typeface="Plantagenet Cherokee"/>
-        <a:font script="Yiii" typeface="Microsoft Yi Baiti"/>
-        <a:font script="Tibt" typeface="Microsoft Himalaya"/>
-        <a:font script="Thaa" typeface="MV Boli"/>
-        <a:font script="Deva" typeface="Mangal"/>
-        <a:font script="Telu" typeface="Gautami"/>
-        <a:font script="Taml" typeface="Latha"/>
-        <a:font script="Syrc" typeface="Estrangelo Edessa"/>
-        <a:font script="Orya" typeface="Kalinga"/>
-        <a:font script="Mlym" typeface="Kartika"/>
-        <a:font script="Laoo" typeface="DokChampa"/>
-        <a:font script="Sinh" typeface="Iskoola Pota"/>
-        <a:font script="Mong" typeface="Mongolian Baiti"/>
-        <a:font script="Viet" typeface="Arial"/>
-        <a:font script="Uigh" typeface="Microsoft Uighur"/>
-        <a:font script="Geor" typeface="Sylfaen"/>
-      </a:minorFont>
-    </a:fontScheme>
-    <a:fmtScheme name="Office">
-      <a:fillStyleLst>
-        <a:solidFill>
-          <a:schemeClr val="phClr"/>
-        </a:solidFill>
-        <a:gradFill rotWithShape="1">
-          <a:gsLst>
-            <a:gs pos="0">
-              <a:schemeClr val="phClr">
-                <a:lumMod val="110000"/>
-                <a:satMod val="105000"/>
-                <a:tint val="67000"/>
-              </a:schemeClr>
-            </a:gs>
-            <a:gs pos="50000">
-              <a:schemeClr val="phClr">
-                <a:lumMod val="105000"/>
-                <a:satMod val="103000"/>
-                <a:tint val="73000"/>
-              </a:schemeClr>
-            </a:gs>
-            <a:gs pos="100000">
-              <a:schemeClr val="phClr">
-                <a:lumMod val="105000"/>
-                <a:satMod val="109000"/>
-                <a:tint val="81000"/>
-              </a:schemeClr>
-            </a:gs>
-          </a:gsLst>
-          <a:lin ang="5400000" scaled="0"/>
-        </a:gradFill>
-        <a:gradFill rotWithShape="1">
-          <a:gsLst>
-            <a:gs pos="0">
-              <a:schemeClr val="phClr">
-                <a:satMod val="103000"/>
-                <a:lumMod val="102000"/>
-                <a:tint val="94000"/>
-              </a:schemeClr>
-            </a:gs>
-            <a:gs pos="50000">
-              <a:schemeClr val="phClr">
-                <a:satMod val="110000"/>
-                <a:lumMod val="100000"/>
-                <a:shade val="100000"/>
-              </a:schemeClr>
-            </a:gs>
-            <a:gs pos="100000">
-              <a:schemeClr val="phClr">
-                <a:lumMod val="99000"/>
-                <a:satMod val="120000"/>
-                <a:shade val="78000"/>
-              </a:schemeClr>
-            </a:gs>
-          </a:gsLst>
-          <a:lin ang="5400000" scaled="0"/>
-        </a:gradFill>
-      </a:fillStyleLst>
-      <a:lnStyleLst>
-        <a:ln w="6350" cap="flat" cmpd="sng" algn="ctr">
-          <a:solidFill>
-            <a:schemeClr val="phClr"/>
-          </a:solidFill>
-          <a:prstDash val="solid"/>
-          <a:miter lim="800000"/>
-        </a:ln>
-        <a:ln w="12700" cap="flat" cmpd="sng" algn="ctr">
-          <a:solidFill>
-            <a:schemeClr val="phClr"/>
-          </a:solidFill>
-          <a:prstDash val="solid"/>
-          <a:miter lim="800000"/>
-        </a:ln>
-        <a:ln w="19050" cap="flat" cmpd="sng" algn="ctr">
-          <a:solidFill>
-            <a:schemeClr val="phClr"/>
-          </a:solidFill>
-          <a:prstDash val="solid"/>
-          <a:miter lim="800000"/>
-        </a:ln>
-      </a:lnStyleLst>
-      <a:effectStyleLst>
-        <a:effectStyle>
-          <a:effectLst/>
-        </a:effectStyle>
-        <a:effectStyle>
-          <a:effectLst/>
-        </a:effectStyle>
-        <a:effectStyle>
-          <a:effectLst>
-            <a:outerShdw blurRad="57150" dist="19050" dir="5400000" algn="ctr" rotWithShape="0">
-              <a:srgbClr val="000000">
-                <a:alpha val="63000"/>
-              </a:srgbClr>
-            </a:outerShdw>
-          </a:effectLst>
-        </a:effectStyle>
-      </a:effectStyleLst>
-      <a:bgFillStyleLst>
-        <a:solidFill>
-          <a:schemeClr val="phClr"/>
-        </a:solidFill>
-        <a:solidFill>
-          <a:schemeClr val="phClr">
-            <a:tint val="95000"/>
-            <a:satMod val="170000"/>
-          </a:schemeClr>
-        </a:solidFill>
-        <a:gradFill rotWithShape="1">
-          <a:gsLst>
-            <a:gs pos="0">
-              <a:schemeClr val="phClr">
-                <a:tint val="93000"/>
-                <a:satMod val="150000"/>
-                <a:shade val="98000"/>
-                <a:lumMod val="102000"/>
-              </a:schemeClr>
-            </a:gs>
-            <a:gs pos="50000">
-              <a:schemeClr val="phClr">
-                <a:tint val="98000"/>
-                <a:satMod val="130000"/>
-                <a:shade val="90000"/>
-                <a:lumMod val="103000"/>
-              </a:schemeClr>
-            </a:gs>
-            <a:gs pos="100000">
-              <a:schemeClr val="phClr">
-                <a:shade val="63000"/>
-                <a:satMod val="120000"/>
-              </a:schemeClr>
-            </a:gs>
-          </a:gsLst>
-          <a:lin ang="5400000" scaled="0"/>
-        </a:gradFill>
-      </a:bgFillStyleLst>
-    </a:fmtScheme>
-  </a:themeElements>
-  <a:objectDefaults/>
-  <a:extraClrSchemeLst/>
-  <a:extLst>
-    <a:ext uri="{05A4C25C-085E-4340-85A3-A5531E510DB2}">
-      <thm15:themeFamily xmlns:thm15="http://schemas.microsoft.com/office/thememl/2012/main" name="Office Theme" id="{62F939B6-93AF-4DB8-9C6B-D6C7DFDC589F}" vid="{4A3C46E8-61CC-4603-A589-7422A47A8E4A}"/>
-    </a:ext>
-  </a:extLst>
-</a:theme>
 </file>
</xml_diff>